<commit_message>
updated reunite deck with some screenshots
for the meeting today. spiffed up the deck.
</commit_message>
<xml_diff>
--- a/ReUnite Overview.pptx
+++ b/ReUnite Overview.pptx
@@ -7,11 +7,14 @@
   <p:sldIdLst>
     <p:sldId id="256" r:id="rId2"/>
     <p:sldId id="267" r:id="rId3"/>
-    <p:sldId id="268" r:id="rId4"/>
-    <p:sldId id="270" r:id="rId5"/>
-    <p:sldId id="271" r:id="rId6"/>
-    <p:sldId id="269" r:id="rId7"/>
-    <p:sldId id="257" r:id="rId8"/>
+    <p:sldId id="272" r:id="rId4"/>
+    <p:sldId id="273" r:id="rId5"/>
+    <p:sldId id="268" r:id="rId6"/>
+    <p:sldId id="270" r:id="rId7"/>
+    <p:sldId id="271" r:id="rId8"/>
+    <p:sldId id="269" r:id="rId9"/>
+    <p:sldId id="274" r:id="rId10"/>
+    <p:sldId id="257" r:id="rId11"/>
   </p:sldIdLst>
   <p:sldSz cx="12192000" cy="6858000"/>
   <p:notesSz cx="6858000" cy="9144000"/>
@@ -3781,6 +3784,36 @@
 </p:sld>
 </file>
 
+<file path=ppt/slides/slide10.xml><?xml version="1.0" encoding="utf-8"?>
+<p:sld xmlns:a="http://schemas.openxmlformats.org/drawingml/2006/main" xmlns:r="http://schemas.openxmlformats.org/officeDocument/2006/relationships" xmlns:p="http://schemas.openxmlformats.org/presentationml/2006/main">
+  <p:cSld>
+    <p:spTree>
+      <p:nvGrpSpPr>
+        <p:cNvPr id="1" name=""/>
+        <p:cNvGrpSpPr/>
+        <p:nvPr/>
+      </p:nvGrpSpPr>
+      <p:grpSpPr>
+        <a:xfrm>
+          <a:off x="0" y="0"/>
+          <a:ext cx="0" cy="0"/>
+          <a:chOff x="0" y="0"/>
+          <a:chExt cx="0" cy="0"/>
+        </a:xfrm>
+      </p:grpSpPr>
+    </p:spTree>
+    <p:extLst>
+      <p:ext uri="{BB962C8B-B14F-4D97-AF65-F5344CB8AC3E}">
+        <p14:creationId xmlns:p14="http://schemas.microsoft.com/office/powerpoint/2010/main" val="4039296401"/>
+      </p:ext>
+    </p:extLst>
+  </p:cSld>
+  <p:clrMapOvr>
+    <a:masterClrMapping/>
+  </p:clrMapOvr>
+</p:sld>
+</file>
+
 <file path=ppt/slides/slide2.xml><?xml version="1.0" encoding="utf-8"?>
 <p:sld xmlns:a="http://schemas.openxmlformats.org/drawingml/2006/main" xmlns:r="http://schemas.openxmlformats.org/officeDocument/2006/relationships" xmlns:p="http://schemas.openxmlformats.org/presentationml/2006/main">
   <p:cSld>
@@ -5773,7 +5806,7 @@
           <p:cNvPr id="2" name="Title 1">
             <a:extLst>
               <a:ext uri="{FF2B5EF4-FFF2-40B4-BE49-F238E27FC236}">
-                <a16:creationId xmlns:a16="http://schemas.microsoft.com/office/drawing/2014/main" id="{8ADD892E-A68F-2444-A43F-41447F2B44A1}"/>
+                <a16:creationId xmlns:a16="http://schemas.microsoft.com/office/drawing/2014/main" id="{9EB7DA22-95DC-9242-B143-C531E072D7CA}"/>
               </a:ext>
             </a:extLst>
           </p:cNvPr>
@@ -5790,115 +5823,124 @@
           <a:lstStyle/>
           <a:p>
             <a:r>
-              <a:rPr lang="en-US" dirty="0" err="1"/>
-              <a:t>ReUnite</a:t>
-            </a:r>
-            <a:endParaRPr lang="en-US" dirty="0"/>
-          </a:p>
-        </p:txBody>
-      </p:sp>
-      <p:sp>
-        <p:nvSpPr>
-          <p:cNvPr id="3" name="Content Placeholder 2">
+              <a:rPr lang="en-US" dirty="0"/>
+              <a:t>Children searching for parents</a:t>
+            </a:r>
+          </a:p>
+        </p:txBody>
+      </p:sp>
+      <p:pic>
+        <p:nvPicPr>
+          <p:cNvPr id="5" name="Content Placeholder 4">
             <a:extLst>
               <a:ext uri="{FF2B5EF4-FFF2-40B4-BE49-F238E27FC236}">
-                <a16:creationId xmlns:a16="http://schemas.microsoft.com/office/drawing/2014/main" id="{85BAD3AB-C8F2-3C4A-BABB-C3C85D20907A}"/>
+                <a16:creationId xmlns:a16="http://schemas.microsoft.com/office/drawing/2014/main" id="{181A5E25-BB68-094E-865F-AC3D301F77DC}"/>
               </a:ext>
             </a:extLst>
           </p:cNvPr>
-          <p:cNvSpPr>
-            <a:spLocks noGrp="1"/>
-          </p:cNvSpPr>
+          <p:cNvPicPr>
+            <a:picLocks noGrp="1" noChangeAspect="1"/>
+          </p:cNvPicPr>
           <p:nvPr>
             <p:ph idx="1"/>
           </p:nvPr>
-        </p:nvSpPr>
-        <p:spPr/>
-        <p:txBody>
-          <a:bodyPr>
-            <a:normAutofit fontScale="85000" lnSpcReduction="10000"/>
+        </p:nvPicPr>
+        <p:blipFill>
+          <a:blip r:embed="rId2"/>
+          <a:stretch>
+            <a:fillRect/>
+          </a:stretch>
+        </p:blipFill>
+        <p:spPr>
+          <a:xfrm>
+            <a:off x="387200" y="1846263"/>
+            <a:ext cx="7470132" cy="4022725"/>
+          </a:xfrm>
+        </p:spPr>
+      </p:pic>
+      <p:sp>
+        <p:nvSpPr>
+          <p:cNvPr id="6" name="TextBox 5">
+            <a:extLst>
+              <a:ext uri="{FF2B5EF4-FFF2-40B4-BE49-F238E27FC236}">
+                <a16:creationId xmlns:a16="http://schemas.microsoft.com/office/drawing/2014/main" id="{F1E2B33F-0271-1642-8833-8BCB7D519445}"/>
+              </a:ext>
+            </a:extLst>
+          </p:cNvPr>
+          <p:cNvSpPr txBox="1"/>
+          <p:nvPr/>
+        </p:nvSpPr>
+        <p:spPr>
+          <a:xfrm>
+            <a:off x="7976681" y="1737360"/>
+            <a:ext cx="3910519" cy="4431983"/>
+          </a:xfrm>
+          <a:prstGeom prst="rect">
+            <a:avLst/>
+          </a:prstGeom>
+          <a:noFill/>
+        </p:spPr>
+        <p:txBody>
+          <a:bodyPr wrap="square" rtlCol="0">
+            <a:spAutoFit/>
           </a:bodyPr>
           <a:lstStyle/>
           <a:p>
-            <a:r>
-              <a:rPr lang="en-US" b="1" dirty="0"/>
-              <a:t>What is it?</a:t>
-            </a:r>
-          </a:p>
-          <a:p>
-            <a:pPr marL="457200" indent="-457200">
-              <a:buFont typeface="+mj-lt"/>
-              <a:buAutoNum type="arabicPeriod"/>
+            <a:pPr marL="285750" indent="-285750">
+              <a:buFont typeface="Arial" panose="020B0604020202020204" pitchFamily="34" charset="0"/>
+              <a:buChar char="•"/>
             </a:pPr>
             <a:r>
               <a:rPr lang="en-US" dirty="0"/>
-              <a:t>A technology that securely enables reunification of families</a:t>
-            </a:r>
-          </a:p>
-          <a:p>
-            <a:r>
-              <a:rPr lang="en-US" b="1" dirty="0"/>
-              <a:t>How it works? – High level process</a:t>
-            </a:r>
-          </a:p>
-          <a:p>
-            <a:pPr marL="457200" indent="-457200">
-              <a:buFont typeface="+mj-lt"/>
-              <a:buAutoNum type="arabicPeriod"/>
+              <a:t>Parents register themselves with a photo and a 30sec video message to their kids. </a:t>
+            </a:r>
+          </a:p>
+          <a:p>
+            <a:pPr marL="742950" lvl="1" indent="-285750">
+              <a:buFont typeface="Arial" panose="020B0604020202020204" pitchFamily="34" charset="0"/>
+              <a:buChar char="•"/>
             </a:pPr>
             <a:r>
-              <a:rPr lang="en-US" dirty="0"/>
-              <a:t>Parents and Children register themselves (or are registered if too young) on a secured tablet or desktop computer at a secured or approved location.</a:t>
-            </a:r>
-          </a:p>
-          <a:p>
-            <a:pPr marL="749808" lvl="1" indent="-457200">
-              <a:buFont typeface="+mj-lt"/>
-              <a:buAutoNum type="arabicPeriod"/>
+              <a:rPr lang="en-US" sz="1600" dirty="0"/>
+              <a:t>Relatives’ names can be entered to give the child context and assurance that this is their parent.</a:t>
+            </a:r>
+          </a:p>
+          <a:p>
+            <a:pPr marL="285750" indent="-285750">
+              <a:buFont typeface="Arial" panose="020B0604020202020204" pitchFamily="34" charset="0"/>
+              <a:buChar char="•"/>
             </a:pPr>
             <a:r>
               <a:rPr lang="en-US" dirty="0"/>
-              <a:t>The registration includes pictures of the parents and children along with a 30 second video message</a:t>
-            </a:r>
-          </a:p>
-          <a:p>
-            <a:pPr marL="457200" indent="-457200">
-              <a:buFont typeface="+mj-lt"/>
-              <a:buAutoNum type="arabicPeriod"/>
+              <a:t>The child browses or searches for their parent by looking at pictures or using the search engine</a:t>
+            </a:r>
+          </a:p>
+          <a:p>
+            <a:pPr marL="285750" indent="-285750">
+              <a:buFont typeface="Arial" panose="020B0604020202020204" pitchFamily="34" charset="0"/>
+              <a:buChar char="•"/>
             </a:pPr>
             <a:r>
               <a:rPr lang="en-US" dirty="0"/>
-              <a:t>Upon finding the family member, the child can click “Claim this person” to indicate a familial connection</a:t>
-            </a:r>
-          </a:p>
-          <a:p>
-            <a:pPr marL="749808" lvl="1" indent="-457200">
-              <a:buFont typeface="+mj-lt"/>
-              <a:buAutoNum type="arabicPeriod"/>
+              <a:t>They click the blue button at the bottom of their screen to claim their parent.</a:t>
+            </a:r>
+          </a:p>
+          <a:p>
+            <a:pPr marL="285750" indent="-285750">
+              <a:buFont typeface="Arial" panose="020B0604020202020204" pitchFamily="34" charset="0"/>
+              <a:buChar char="•"/>
             </a:pPr>
             <a:r>
               <a:rPr lang="en-US" dirty="0"/>
-              <a:t>A ticket is issued but all of the information remains internal to the db. Only name and other approved info will be displayed</a:t>
-            </a:r>
-          </a:p>
-          <a:p>
-            <a:pPr marL="457200" indent="-457200">
-              <a:buFont typeface="+mj-lt"/>
-              <a:buAutoNum type="arabicPeriod"/>
-            </a:pPr>
-            <a:r>
-              <a:rPr lang="en-US" dirty="0"/>
-              <a:t>The facilities/Orgs access the central database and start working on the potential matches to reunite families</a:t>
-            </a:r>
-          </a:p>
-          <a:p>
-            <a:pPr marL="457200" indent="-457200">
-              <a:buFont typeface="+mj-lt"/>
-              <a:buAutoNum type="arabicPeriod"/>
-            </a:pPr>
-            <a:r>
-              <a:rPr lang="en-US" dirty="0"/>
-              <a:t>Verification of the match is completely up to the organization or facility. The application merely provides the data on potential matches </a:t>
+              <a:t>The </a:t>
+            </a:r>
+            <a:r>
+              <a:rPr lang="en-US" dirty="0" err="1"/>
+              <a:t>ReUnite</a:t>
+            </a:r>
+            <a:r>
+              <a:rPr lang="en-US" dirty="0"/>
+              <a:t> system then enters a “potential match” and opens up a ticket for the administrators to work through.</a:t>
             </a:r>
           </a:p>
         </p:txBody>
@@ -5906,7 +5948,7 @@
     </p:spTree>
     <p:extLst>
       <p:ext uri="{BB962C8B-B14F-4D97-AF65-F5344CB8AC3E}">
-        <p14:creationId xmlns:p14="http://schemas.microsoft.com/office/powerpoint/2010/main" val="1779747090"/>
+        <p14:creationId xmlns:p14="http://schemas.microsoft.com/office/powerpoint/2010/main" val="7073876"/>
       </p:ext>
     </p:extLst>
   </p:cSld>
@@ -5938,7 +5980,7 @@
           <p:cNvPr id="2" name="Title 1">
             <a:extLst>
               <a:ext uri="{FF2B5EF4-FFF2-40B4-BE49-F238E27FC236}">
-                <a16:creationId xmlns:a16="http://schemas.microsoft.com/office/drawing/2014/main" id="{2AA5192C-7721-B84F-9F07-38156320FC8B}"/>
+                <a16:creationId xmlns:a16="http://schemas.microsoft.com/office/drawing/2014/main" id="{F66D9DA3-5DAD-9048-BCA8-2F54A9D4DA5E}"/>
               </a:ext>
             </a:extLst>
           </p:cNvPr>
@@ -5955,171 +5997,104 @@
           <a:lstStyle/>
           <a:p>
             <a:r>
-              <a:rPr lang="en-US" dirty="0" err="1"/>
-              <a:t>ReUnite</a:t>
-            </a:r>
-            <a:endParaRPr lang="en-US" dirty="0"/>
-          </a:p>
-        </p:txBody>
-      </p:sp>
-      <p:sp>
-        <p:nvSpPr>
-          <p:cNvPr id="3" name="Content Placeholder 2">
+              <a:rPr lang="en-US" dirty="0"/>
+              <a:t>Facility Administrators</a:t>
+            </a:r>
+          </a:p>
+        </p:txBody>
+      </p:sp>
+      <p:pic>
+        <p:nvPicPr>
+          <p:cNvPr id="5" name="Content Placeholder 4">
             <a:extLst>
               <a:ext uri="{FF2B5EF4-FFF2-40B4-BE49-F238E27FC236}">
-                <a16:creationId xmlns:a16="http://schemas.microsoft.com/office/drawing/2014/main" id="{191BE215-BBF7-6648-9613-2A8E56A4A2E1}"/>
+                <a16:creationId xmlns:a16="http://schemas.microsoft.com/office/drawing/2014/main" id="{20E4F03B-4CE6-0B40-B3CA-6BE8D459FF61}"/>
               </a:ext>
             </a:extLst>
           </p:cNvPr>
-          <p:cNvSpPr>
-            <a:spLocks noGrp="1"/>
-          </p:cNvSpPr>
+          <p:cNvPicPr>
+            <a:picLocks noGrp="1" noChangeAspect="1"/>
+          </p:cNvPicPr>
           <p:nvPr>
             <p:ph idx="1"/>
           </p:nvPr>
-        </p:nvSpPr>
-        <p:spPr/>
-        <p:txBody>
-          <a:bodyPr>
-            <a:normAutofit fontScale="92500" lnSpcReduction="20000"/>
+        </p:nvPicPr>
+        <p:blipFill>
+          <a:blip r:embed="rId2"/>
+          <a:stretch>
+            <a:fillRect/>
+          </a:stretch>
+        </p:blipFill>
+        <p:spPr>
+          <a:xfrm>
+            <a:off x="1097280" y="2048107"/>
+            <a:ext cx="10058400" cy="2334985"/>
+          </a:xfrm>
+        </p:spPr>
+      </p:pic>
+      <p:sp>
+        <p:nvSpPr>
+          <p:cNvPr id="6" name="TextBox 5">
+            <a:extLst>
+              <a:ext uri="{FF2B5EF4-FFF2-40B4-BE49-F238E27FC236}">
+                <a16:creationId xmlns:a16="http://schemas.microsoft.com/office/drawing/2014/main" id="{C7F9A115-7F76-CC4C-B950-6C59BBFC3D52}"/>
+              </a:ext>
+            </a:extLst>
+          </p:cNvPr>
+          <p:cNvSpPr txBox="1"/>
+          <p:nvPr/>
+        </p:nvSpPr>
+        <p:spPr>
+          <a:xfrm>
+            <a:off x="1097280" y="4693839"/>
+            <a:ext cx="10269286" cy="923330"/>
+          </a:xfrm>
+          <a:prstGeom prst="rect">
+            <a:avLst/>
+          </a:prstGeom>
+          <a:noFill/>
+        </p:spPr>
+        <p:txBody>
+          <a:bodyPr wrap="none" rtlCol="0">
+            <a:spAutoFit/>
           </a:bodyPr>
           <a:lstStyle/>
           <a:p>
-            <a:r>
-              <a:rPr lang="en-US" dirty="0"/>
-              <a:t>What the admin does (Walk-through):</a:t>
-            </a:r>
-          </a:p>
-          <a:p>
-            <a:pPr marL="457200" indent="-457200">
-              <a:buFont typeface="+mj-lt"/>
-              <a:buAutoNum type="arabicPeriod"/>
+            <a:pPr marL="285750" indent="-285750">
+              <a:buFont typeface="Arial" panose="020B0604020202020204" pitchFamily="34" charset="0"/>
+              <a:buChar char="•"/>
             </a:pPr>
             <a:r>
               <a:rPr lang="en-US" dirty="0"/>
-              <a:t>Child or validated parent approaches</a:t>
-            </a:r>
-          </a:p>
-          <a:p>
-            <a:pPr marL="457200" indent="-457200">
-              <a:buFont typeface="+mj-lt"/>
-              <a:buAutoNum type="arabicPeriod"/>
+              <a:t>Tools are available for administrators to manage ticket queues and find potential matches for verification</a:t>
+            </a:r>
+          </a:p>
+          <a:p>
+            <a:pPr marL="285750" indent="-285750">
+              <a:buFont typeface="Arial" panose="020B0604020202020204" pitchFamily="34" charset="0"/>
+              <a:buChar char="•"/>
             </a:pPr>
             <a:r>
               <a:rPr lang="en-US" dirty="0"/>
-              <a:t>Registration information is taken in</a:t>
-            </a:r>
-          </a:p>
-          <a:p>
-            <a:pPr marL="457200" indent="-457200">
-              <a:buFont typeface="+mj-lt"/>
-              <a:buAutoNum type="arabicPeriod"/>
+              <a:t>Administrators register the children and the adults.</a:t>
+            </a:r>
+          </a:p>
+          <a:p>
+            <a:pPr marL="742950" lvl="1" indent="-285750">
+              <a:buFont typeface="Arial" panose="020B0604020202020204" pitchFamily="34" charset="0"/>
+              <a:buChar char="•"/>
             </a:pPr>
             <a:r>
               <a:rPr lang="en-US" dirty="0"/>
-              <a:t>Photo is taken</a:t>
-            </a:r>
-          </a:p>
-          <a:p>
-            <a:pPr marL="457200" indent="-457200">
-              <a:buFont typeface="+mj-lt"/>
-              <a:buAutoNum type="arabicPeriod"/>
-            </a:pPr>
-            <a:r>
-              <a:rPr lang="en-US" dirty="0"/>
-              <a:t>Short 30 second video is taken </a:t>
-            </a:r>
-          </a:p>
-          <a:p>
-            <a:pPr marL="749808" lvl="1" indent="-457200">
-              <a:buFont typeface="+mj-lt"/>
-              <a:buAutoNum type="arabicPeriod"/>
-            </a:pPr>
-            <a:r>
-              <a:rPr lang="en-US" dirty="0"/>
-              <a:t>(”</a:t>
+              <a:t>Everything in </a:t>
             </a:r>
             <a:r>
               <a:rPr lang="en-US" dirty="0" err="1"/>
-              <a:t>Hola</a:t>
-            </a:r>
-            <a:r>
-              <a:rPr lang="en-US" dirty="0"/>
-              <a:t> </a:t>
-            </a:r>
-            <a:r>
-              <a:rPr lang="en-US" dirty="0" err="1"/>
-              <a:t>papi</a:t>
-            </a:r>
-            <a:r>
-              <a:rPr lang="en-US" dirty="0"/>
-              <a:t>, </a:t>
-            </a:r>
-            <a:r>
-              <a:rPr lang="en-US" dirty="0" err="1"/>
-              <a:t>te</a:t>
-            </a:r>
-            <a:r>
-              <a:rPr lang="en-US" dirty="0"/>
-              <a:t> </a:t>
-            </a:r>
-            <a:r>
-              <a:rPr lang="en-US" dirty="0" err="1"/>
-              <a:t>extrano</a:t>
-            </a:r>
-            <a:r>
-              <a:rPr lang="en-US" dirty="0"/>
-              <a:t>!”)</a:t>
-            </a:r>
-          </a:p>
-          <a:p>
-            <a:pPr marL="457200" indent="-457200">
-              <a:buFont typeface="+mj-lt"/>
-              <a:buAutoNum type="arabicPeriod"/>
-            </a:pPr>
-            <a:r>
-              <a:rPr lang="en-US" dirty="0"/>
-              <a:t>Child is allowed to search for their relatives by name or browse photos</a:t>
-            </a:r>
-          </a:p>
-          <a:p>
-            <a:pPr marL="457200" indent="-457200">
-              <a:buFont typeface="+mj-lt"/>
-              <a:buAutoNum type="arabicPeriod"/>
-            </a:pPr>
-            <a:r>
-              <a:rPr lang="en-US" dirty="0"/>
-              <a:t>A ticket is issued if a child has found a potential match for their parent</a:t>
-            </a:r>
-          </a:p>
-          <a:p>
-            <a:pPr marL="457200" indent="-457200">
-              <a:buFont typeface="+mj-lt"/>
-              <a:buAutoNum type="arabicPeriod"/>
-            </a:pPr>
-            <a:r>
-              <a:rPr lang="en-US" dirty="0"/>
-              <a:t>Validation process begins</a:t>
-            </a:r>
-          </a:p>
-          <a:p>
-            <a:pPr marL="457200" indent="-457200">
-              <a:buFont typeface="+mj-lt"/>
-              <a:buAutoNum type="arabicPeriod"/>
-            </a:pPr>
-            <a:endParaRPr lang="en-US" dirty="0"/>
-          </a:p>
-          <a:p>
-            <a:pPr marL="0" indent="0">
-              <a:buNone/>
-            </a:pPr>
-            <a:r>
-              <a:rPr lang="en-US" b="1" dirty="0"/>
-              <a:t>NOTE</a:t>
-            </a:r>
-            <a:r>
-              <a:rPr lang="en-US" dirty="0"/>
-              <a:t>: This is all done in-facility and under supervision</a:t>
+              <a:t>ReUnite</a:t>
+            </a:r>
+            <a:r>
+              <a:rPr lang="en-US" dirty="0"/>
+              <a:t> happens under supervision of the admin</a:t>
             </a:r>
           </a:p>
         </p:txBody>
@@ -6127,7 +6102,7 @@
     </p:spTree>
     <p:extLst>
       <p:ext uri="{BB962C8B-B14F-4D97-AF65-F5344CB8AC3E}">
-        <p14:creationId xmlns:p14="http://schemas.microsoft.com/office/powerpoint/2010/main" val="1497192962"/>
+        <p14:creationId xmlns:p14="http://schemas.microsoft.com/office/powerpoint/2010/main" val="1707675513"/>
       </p:ext>
     </p:extLst>
   </p:cSld>
@@ -6159,7 +6134,7 @@
           <p:cNvPr id="2" name="Title 1">
             <a:extLst>
               <a:ext uri="{FF2B5EF4-FFF2-40B4-BE49-F238E27FC236}">
-                <a16:creationId xmlns:a16="http://schemas.microsoft.com/office/drawing/2014/main" id="{1E67313C-A334-4F48-A953-3A4C46DF8D66}"/>
+                <a16:creationId xmlns:a16="http://schemas.microsoft.com/office/drawing/2014/main" id="{8ADD892E-A68F-2444-A43F-41447F2B44A1}"/>
               </a:ext>
             </a:extLst>
           </p:cNvPr>
@@ -6176,9 +6151,10 @@
           <a:lstStyle/>
           <a:p>
             <a:r>
-              <a:rPr lang="en-US" dirty="0"/>
-              <a:t>What happens next</a:t>
-            </a:r>
+              <a:rPr lang="en-US" dirty="0" err="1"/>
+              <a:t>ReUnite</a:t>
+            </a:r>
+            <a:endParaRPr lang="en-US" dirty="0"/>
           </a:p>
         </p:txBody>
       </p:sp>
@@ -6187,7 +6163,7 @@
           <p:cNvPr id="3" name="Content Placeholder 2">
             <a:extLst>
               <a:ext uri="{FF2B5EF4-FFF2-40B4-BE49-F238E27FC236}">
-                <a16:creationId xmlns:a16="http://schemas.microsoft.com/office/drawing/2014/main" id="{BE6F4560-FB08-F24A-BB0F-219E0736CB45}"/>
+                <a16:creationId xmlns:a16="http://schemas.microsoft.com/office/drawing/2014/main" id="{85BAD3AB-C8F2-3C4A-BABB-C3C85D20907A}"/>
               </a:ext>
             </a:extLst>
           </p:cNvPr>
@@ -6200,8 +6176,16 @@
         </p:nvSpPr>
         <p:spPr/>
         <p:txBody>
-          <a:bodyPr/>
+          <a:bodyPr>
+            <a:normAutofit fontScale="85000" lnSpcReduction="10000"/>
+          </a:bodyPr>
           <a:lstStyle/>
+          <a:p>
+            <a:r>
+              <a:rPr lang="en-US" b="1" dirty="0"/>
+              <a:t>What is it?</a:t>
+            </a:r>
+          </a:p>
           <a:p>
             <a:pPr marL="457200" indent="-457200">
               <a:buFont typeface="+mj-lt"/>
@@ -6209,7 +6193,13 @@
             </a:pPr>
             <a:r>
               <a:rPr lang="en-US" dirty="0"/>
-              <a:t>If a child or validated parent finds their family member, the tap or click a button that says “claim” or something similar. </a:t>
+              <a:t>A technology that securely enables reunification of families</a:t>
+            </a:r>
+          </a:p>
+          <a:p>
+            <a:r>
+              <a:rPr lang="en-US" b="1" dirty="0"/>
+              <a:t>How it works? – High level process</a:t>
             </a:r>
           </a:p>
           <a:p>
@@ -6219,15 +6209,17 @@
             </a:pPr>
             <a:r>
               <a:rPr lang="en-US" dirty="0"/>
-              <a:t>This sends the claim to a </a:t>
-            </a:r>
-            <a:r>
-              <a:rPr lang="en-US" dirty="0" err="1"/>
-              <a:t>db</a:t>
-            </a:r>
-            <a:r>
-              <a:rPr lang="en-US" dirty="0"/>
-              <a:t> where all the claims are held. It also opens a ticket.</a:t>
+              <a:t>Parents and Children register themselves (or are registered if too young) on a secured tablet or desktop computer at a secured or approved location. (strong security certificates are used)</a:t>
+            </a:r>
+          </a:p>
+          <a:p>
+            <a:pPr marL="749808" lvl="1" indent="-457200">
+              <a:buFont typeface="+mj-lt"/>
+              <a:buAutoNum type="arabicPeriod"/>
+            </a:pPr>
+            <a:r>
+              <a:rPr lang="en-US" dirty="0"/>
+              <a:t>The registration includes pictures of the parents and children along with a 30 second video message</a:t>
             </a:r>
           </a:p>
           <a:p>
@@ -6237,7 +6229,27 @@
             </a:pPr>
             <a:r>
               <a:rPr lang="en-US" dirty="0"/>
-              <a:t>An algorithm goes through and identifies instances when people have claimed each other and marks these claims as “potential-matches” along with opening up a ticket for an admin to work through.</a:t>
+              <a:t>Upon finding the family member, the child can click “Claim this person” to indicate a familial connection</a:t>
+            </a:r>
+          </a:p>
+          <a:p>
+            <a:pPr marL="749808" lvl="1" indent="-457200">
+              <a:buFont typeface="+mj-lt"/>
+              <a:buAutoNum type="arabicPeriod"/>
+            </a:pPr>
+            <a:r>
+              <a:rPr lang="en-US" dirty="0"/>
+              <a:t>A ticket is issued but all of the information remains internal to the database. </a:t>
+            </a:r>
+          </a:p>
+          <a:p>
+            <a:pPr marL="749808" lvl="1" indent="-457200">
+              <a:buFont typeface="+mj-lt"/>
+              <a:buAutoNum type="arabicPeriod"/>
+            </a:pPr>
+            <a:r>
+              <a:rPr lang="en-US" dirty="0"/>
+              <a:t>Only name and other approved info will be displayed</a:t>
             </a:r>
           </a:p>
           <a:p>
@@ -6247,17 +6259,7 @@
             </a:pPr>
             <a:r>
               <a:rPr lang="en-US" dirty="0"/>
-              <a:t>Once a ticket is generated, the application only has a way of closing the ticket or adding status to it. </a:t>
-            </a:r>
-          </a:p>
-          <a:p>
-            <a:pPr marL="749808" lvl="1" indent="-457200">
-              <a:buFont typeface="+mj-lt"/>
-              <a:buAutoNum type="arabicPeriod"/>
-            </a:pPr>
-            <a:r>
-              <a:rPr lang="en-US" dirty="0"/>
-              <a:t>The reunite system is not responsible for validating a match. Only identifying potential matches.</a:t>
+              <a:t>The facilities/Orgs access the central database and start working on the potential matches to reunite families</a:t>
             </a:r>
           </a:p>
           <a:p>
@@ -6267,7 +6269,7 @@
             </a:pPr>
             <a:r>
               <a:rPr lang="en-US" dirty="0"/>
-              <a:t>An admin can also look through the claims database and find claims that may not be matched but they know from experience and they can open up a ticket to work it. </a:t>
+              <a:t>Verification of the match is completely up to the organization or facility. The application merely provides the data on potential matches and manages ticket work.</a:t>
             </a:r>
           </a:p>
         </p:txBody>
@@ -6275,7 +6277,7 @@
     </p:spTree>
     <p:extLst>
       <p:ext uri="{BB962C8B-B14F-4D97-AF65-F5344CB8AC3E}">
-        <p14:creationId xmlns:p14="http://schemas.microsoft.com/office/powerpoint/2010/main" val="1007445634"/>
+        <p14:creationId xmlns:p14="http://schemas.microsoft.com/office/powerpoint/2010/main" val="1779747090"/>
       </p:ext>
     </p:extLst>
   </p:cSld>
@@ -6307,7 +6309,7 @@
           <p:cNvPr id="2" name="Title 1">
             <a:extLst>
               <a:ext uri="{FF2B5EF4-FFF2-40B4-BE49-F238E27FC236}">
-                <a16:creationId xmlns:a16="http://schemas.microsoft.com/office/drawing/2014/main" id="{A206403A-6B13-5D4D-9524-EF700CC2FF9A}"/>
+                <a16:creationId xmlns:a16="http://schemas.microsoft.com/office/drawing/2014/main" id="{2AA5192C-7721-B84F-9F07-38156320FC8B}"/>
               </a:ext>
             </a:extLst>
           </p:cNvPr>
@@ -6324,9 +6326,10 @@
           <a:lstStyle/>
           <a:p>
             <a:r>
-              <a:rPr lang="en-US" dirty="0"/>
-              <a:t>Security</a:t>
-            </a:r>
+              <a:rPr lang="en-US" dirty="0" err="1"/>
+              <a:t>ReUnite</a:t>
+            </a:r>
+            <a:endParaRPr lang="en-US" dirty="0"/>
           </a:p>
         </p:txBody>
       </p:sp>
@@ -6335,7 +6338,7 @@
           <p:cNvPr id="3" name="Content Placeholder 2">
             <a:extLst>
               <a:ext uri="{FF2B5EF4-FFF2-40B4-BE49-F238E27FC236}">
-                <a16:creationId xmlns:a16="http://schemas.microsoft.com/office/drawing/2014/main" id="{6BEB79EA-465B-4946-8C22-FAAA2A79322B}"/>
+                <a16:creationId xmlns:a16="http://schemas.microsoft.com/office/drawing/2014/main" id="{191BE215-BBF7-6648-9613-2A8E56A4A2E1}"/>
               </a:ext>
             </a:extLst>
           </p:cNvPr>
@@ -6353,30 +6356,19 @@
           </a:bodyPr>
           <a:lstStyle/>
           <a:p>
+            <a:r>
+              <a:rPr lang="en-US" dirty="0"/>
+              <a:t>What the admin does (Walk-through):</a:t>
+            </a:r>
+          </a:p>
+          <a:p>
             <a:pPr marL="457200" indent="-457200">
               <a:buFont typeface="+mj-lt"/>
               <a:buAutoNum type="arabicPeriod"/>
             </a:pPr>
             <a:r>
               <a:rPr lang="en-US" dirty="0"/>
-              <a:t>The tablet or PC will have a secure certificate to ensure that it is approved to connect to the VPN</a:t>
-            </a:r>
-          </a:p>
-          <a:p>
-            <a:pPr marL="292608" lvl="1" indent="0">
-              <a:buNone/>
-            </a:pPr>
-            <a:r>
-              <a:rPr lang="en-US" dirty="0"/>
-              <a:t>    No other device will have access to this </a:t>
-            </a:r>
-            <a:r>
-              <a:rPr lang="en-US" dirty="0" err="1"/>
-              <a:t>vpn</a:t>
-            </a:r>
-            <a:r>
-              <a:rPr lang="en-US" dirty="0"/>
-              <a:t> outside of the facilities.</a:t>
+              <a:t>Child or validated parent approaches</a:t>
             </a:r>
           </a:p>
           <a:p>
@@ -6386,15 +6378,7 @@
             </a:pPr>
             <a:r>
               <a:rPr lang="en-US" dirty="0"/>
-              <a:t>Each administrator approved will have a secure username and password to connect to the </a:t>
-            </a:r>
-            <a:r>
-              <a:rPr lang="en-US" dirty="0" err="1"/>
-              <a:t>vpn</a:t>
-            </a:r>
-            <a:r>
-              <a:rPr lang="en-US" dirty="0"/>
-              <a:t> (think of it as being clocked in)</a:t>
+              <a:t>Registration information is taken in</a:t>
             </a:r>
           </a:p>
           <a:p>
@@ -6404,7 +6388,7 @@
             </a:pPr>
             <a:r>
               <a:rPr lang="en-US" dirty="0"/>
-              <a:t>Each administrator approved will have a secure username and password to log into the application (second level of verification of who’s accessing the system)</a:t>
+              <a:t>Photo is taken</a:t>
             </a:r>
           </a:p>
           <a:p>
@@ -6414,15 +6398,73 @@
             </a:pPr>
             <a:r>
               <a:rPr lang="en-US" dirty="0"/>
-              <a:t>The website is tablet/phone/pc friendly (responsive) and is ONLY accessible through the VPN. (Access from an address on the internet or any other address outside of the </a:t>
+              <a:t>Short 30 second video is taken </a:t>
+            </a:r>
+          </a:p>
+          <a:p>
+            <a:pPr marL="749808" lvl="1" indent="-457200">
+              <a:buFont typeface="+mj-lt"/>
+              <a:buAutoNum type="arabicPeriod"/>
+            </a:pPr>
+            <a:r>
+              <a:rPr lang="en-US" dirty="0"/>
+              <a:t>(”</a:t>
             </a:r>
             <a:r>
               <a:rPr lang="en-US" dirty="0" err="1"/>
-              <a:t>vpn</a:t>
-            </a:r>
-            <a:r>
-              <a:rPr lang="en-US" dirty="0"/>
-              <a:t> is strictly disallowed)</a:t>
+              <a:t>Hola</a:t>
+            </a:r>
+            <a:r>
+              <a:rPr lang="en-US" dirty="0"/>
+              <a:t> </a:t>
+            </a:r>
+            <a:r>
+              <a:rPr lang="en-US" dirty="0" err="1"/>
+              <a:t>mijo</a:t>
+            </a:r>
+            <a:r>
+              <a:rPr lang="en-US" dirty="0"/>
+              <a:t>, </a:t>
+            </a:r>
+            <a:r>
+              <a:rPr lang="en-US" dirty="0" err="1"/>
+              <a:t>te</a:t>
+            </a:r>
+            <a:r>
+              <a:rPr lang="en-US" dirty="0"/>
+              <a:t> </a:t>
+            </a:r>
+            <a:r>
+              <a:rPr lang="en-US" dirty="0" err="1"/>
+              <a:t>extraño</a:t>
+            </a:r>
+            <a:r>
+              <a:rPr lang="en-US" dirty="0"/>
+              <a:t>! </a:t>
+            </a:r>
+            <a:r>
+              <a:rPr lang="en-US" dirty="0" err="1"/>
+              <a:t>Ya</a:t>
+            </a:r>
+            <a:r>
+              <a:rPr lang="en-US" dirty="0"/>
+              <a:t> pronto </a:t>
+            </a:r>
+            <a:r>
+              <a:rPr lang="en-US" dirty="0" err="1"/>
+              <a:t>estaremos</a:t>
+            </a:r>
+            <a:r>
+              <a:rPr lang="en-US" dirty="0"/>
+              <a:t> </a:t>
+            </a:r>
+            <a:r>
+              <a:rPr lang="en-US" dirty="0" err="1"/>
+              <a:t>juntos</a:t>
+            </a:r>
+            <a:r>
+              <a:rPr lang="en-US" dirty="0"/>
+              <a:t>!”)</a:t>
             </a:r>
           </a:p>
           <a:p>
@@ -6432,7 +6474,7 @@
             </a:pPr>
             <a:r>
               <a:rPr lang="en-US" dirty="0"/>
-              <a:t>The data displayed as people browse is the minimal amount for identification</a:t>
+              <a:t>Child is allowed to search for their relatives by name or browse photos</a:t>
             </a:r>
           </a:p>
           <a:p>
@@ -6442,7 +6484,7 @@
             </a:pPr>
             <a:r>
               <a:rPr lang="en-US" dirty="0"/>
-              <a:t>Images taken by administrators will only be saved on Centerpoint cloud servers. No exports allowed unless clearance is provided.</a:t>
+              <a:t>A ticket is issued if a child has found a potential match for their parent</a:t>
             </a:r>
           </a:p>
           <a:p>
@@ -6452,7 +6494,7 @@
             </a:pPr>
             <a:r>
               <a:rPr lang="en-US" dirty="0"/>
-              <a:t>Videos will be moderated by the admins so they do not reveal location of the person</a:t>
+              <a:t>Validation process begins per the facility’s established procedures</a:t>
             </a:r>
           </a:p>
           <a:p>
@@ -6462,12 +6504,25 @@
             </a:pPr>
             <a:endParaRPr lang="en-US" dirty="0"/>
           </a:p>
+          <a:p>
+            <a:pPr marL="0" indent="0">
+              <a:buNone/>
+            </a:pPr>
+            <a:r>
+              <a:rPr lang="en-US" b="1" dirty="0"/>
+              <a:t>NOTE</a:t>
+            </a:r>
+            <a:r>
+              <a:rPr lang="en-US" dirty="0"/>
+              <a:t>: This is all done in-facility and under supervision</a:t>
+            </a:r>
+          </a:p>
         </p:txBody>
       </p:sp>
     </p:spTree>
     <p:extLst>
       <p:ext uri="{BB962C8B-B14F-4D97-AF65-F5344CB8AC3E}">
-        <p14:creationId xmlns:p14="http://schemas.microsoft.com/office/powerpoint/2010/main" val="4197606523"/>
+        <p14:creationId xmlns:p14="http://schemas.microsoft.com/office/powerpoint/2010/main" val="1497192962"/>
       </p:ext>
     </p:extLst>
   </p:cSld>
@@ -6494,10 +6549,451 @@
           <a:chExt cx="0" cy="0"/>
         </a:xfrm>
       </p:grpSpPr>
+      <p:sp>
+        <p:nvSpPr>
+          <p:cNvPr id="2" name="Title 1">
+            <a:extLst>
+              <a:ext uri="{FF2B5EF4-FFF2-40B4-BE49-F238E27FC236}">
+                <a16:creationId xmlns:a16="http://schemas.microsoft.com/office/drawing/2014/main" id="{1E67313C-A334-4F48-A953-3A4C46DF8D66}"/>
+              </a:ext>
+            </a:extLst>
+          </p:cNvPr>
+          <p:cNvSpPr>
+            <a:spLocks noGrp="1"/>
+          </p:cNvSpPr>
+          <p:nvPr>
+            <p:ph type="title"/>
+          </p:nvPr>
+        </p:nvSpPr>
+        <p:spPr/>
+        <p:txBody>
+          <a:bodyPr/>
+          <a:lstStyle/>
+          <a:p>
+            <a:r>
+              <a:rPr lang="en-US" dirty="0"/>
+              <a:t>What happens next</a:t>
+            </a:r>
+          </a:p>
+        </p:txBody>
+      </p:sp>
+      <p:sp>
+        <p:nvSpPr>
+          <p:cNvPr id="3" name="Content Placeholder 2">
+            <a:extLst>
+              <a:ext uri="{FF2B5EF4-FFF2-40B4-BE49-F238E27FC236}">
+                <a16:creationId xmlns:a16="http://schemas.microsoft.com/office/drawing/2014/main" id="{BE6F4560-FB08-F24A-BB0F-219E0736CB45}"/>
+              </a:ext>
+            </a:extLst>
+          </p:cNvPr>
+          <p:cNvSpPr>
+            <a:spLocks noGrp="1"/>
+          </p:cNvSpPr>
+          <p:nvPr>
+            <p:ph idx="1"/>
+          </p:nvPr>
+        </p:nvSpPr>
+        <p:spPr/>
+        <p:txBody>
+          <a:bodyPr>
+            <a:normAutofit/>
+          </a:bodyPr>
+          <a:lstStyle/>
+          <a:p>
+            <a:pPr marL="457200" indent="-457200">
+              <a:buFont typeface="+mj-lt"/>
+              <a:buAutoNum type="arabicPeriod"/>
+            </a:pPr>
+            <a:r>
+              <a:rPr lang="en-US" dirty="0"/>
+              <a:t>If a child finds their family member, they tap or click a button that says “claim”.</a:t>
+            </a:r>
+          </a:p>
+          <a:p>
+            <a:pPr marL="457200" indent="-457200">
+              <a:buFont typeface="+mj-lt"/>
+              <a:buAutoNum type="arabicPeriod"/>
+            </a:pPr>
+            <a:r>
+              <a:rPr lang="en-US" dirty="0"/>
+              <a:t>This sends the claim to a database where all the claims are held. It also opens a ticket.</a:t>
+            </a:r>
+          </a:p>
+          <a:p>
+            <a:pPr marL="457200" indent="-457200">
+              <a:buFont typeface="+mj-lt"/>
+              <a:buAutoNum type="arabicPeriod"/>
+            </a:pPr>
+            <a:r>
+              <a:rPr lang="en-US" dirty="0"/>
+              <a:t>An algorithm goes through and identifies instances when people have claimed each other and marks these claims as “potential-matches” along with opening up a ticket for an admin to work through.</a:t>
+            </a:r>
+          </a:p>
+          <a:p>
+            <a:pPr marL="749808" lvl="1" indent="-457200">
+              <a:buFont typeface="+mj-lt"/>
+              <a:buAutoNum type="arabicPeriod"/>
+            </a:pPr>
+            <a:r>
+              <a:rPr lang="en-US" dirty="0"/>
+              <a:t>This works in the instances where siblings have been separated for some reason.</a:t>
+            </a:r>
+          </a:p>
+          <a:p>
+            <a:pPr marL="457200" indent="-457200">
+              <a:buFont typeface="+mj-lt"/>
+              <a:buAutoNum type="arabicPeriod"/>
+            </a:pPr>
+            <a:r>
+              <a:rPr lang="en-US" dirty="0"/>
+              <a:t>Once a ticket is generated, the application only has a way of closing the ticket or adding status to it. </a:t>
+            </a:r>
+          </a:p>
+          <a:p>
+            <a:pPr marL="749808" lvl="1" indent="-457200">
+              <a:buFont typeface="+mj-lt"/>
+              <a:buAutoNum type="arabicPeriod"/>
+            </a:pPr>
+            <a:r>
+              <a:rPr lang="en-US" dirty="0"/>
+              <a:t>The </a:t>
+            </a:r>
+            <a:r>
+              <a:rPr lang="en-US" dirty="0" err="1"/>
+              <a:t>ReUnite</a:t>
+            </a:r>
+            <a:r>
+              <a:rPr lang="en-US" dirty="0"/>
+              <a:t> system is not responsible for validating a match. Only identifying potential matches.</a:t>
+            </a:r>
+          </a:p>
+          <a:p>
+            <a:pPr marL="457200" indent="-457200">
+              <a:buFont typeface="+mj-lt"/>
+              <a:buAutoNum type="arabicPeriod"/>
+            </a:pPr>
+            <a:r>
+              <a:rPr lang="en-US" dirty="0"/>
+              <a:t>An admin can also look through the claims database and find claims that may not be matched but they know from experience and they can open up a ticket to work it. </a:t>
+            </a:r>
+          </a:p>
+        </p:txBody>
+      </p:sp>
     </p:spTree>
     <p:extLst>
       <p:ext uri="{BB962C8B-B14F-4D97-AF65-F5344CB8AC3E}">
-        <p14:creationId xmlns:p14="http://schemas.microsoft.com/office/powerpoint/2010/main" val="4039296401"/>
+        <p14:creationId xmlns:p14="http://schemas.microsoft.com/office/powerpoint/2010/main" val="1007445634"/>
+      </p:ext>
+    </p:extLst>
+  </p:cSld>
+  <p:clrMapOvr>
+    <a:masterClrMapping/>
+  </p:clrMapOvr>
+</p:sld>
+</file>
+
+<file path=ppt/slides/slide8.xml><?xml version="1.0" encoding="utf-8"?>
+<p:sld xmlns:a="http://schemas.openxmlformats.org/drawingml/2006/main" xmlns:r="http://schemas.openxmlformats.org/officeDocument/2006/relationships" xmlns:p="http://schemas.openxmlformats.org/presentationml/2006/main">
+  <p:cSld>
+    <p:spTree>
+      <p:nvGrpSpPr>
+        <p:cNvPr id="1" name=""/>
+        <p:cNvGrpSpPr/>
+        <p:nvPr/>
+      </p:nvGrpSpPr>
+      <p:grpSpPr>
+        <a:xfrm>
+          <a:off x="0" y="0"/>
+          <a:ext cx="0" cy="0"/>
+          <a:chOff x="0" y="0"/>
+          <a:chExt cx="0" cy="0"/>
+        </a:xfrm>
+      </p:grpSpPr>
+      <p:sp>
+        <p:nvSpPr>
+          <p:cNvPr id="2" name="Title 1">
+            <a:extLst>
+              <a:ext uri="{FF2B5EF4-FFF2-40B4-BE49-F238E27FC236}">
+                <a16:creationId xmlns:a16="http://schemas.microsoft.com/office/drawing/2014/main" id="{A206403A-6B13-5D4D-9524-EF700CC2FF9A}"/>
+              </a:ext>
+            </a:extLst>
+          </p:cNvPr>
+          <p:cNvSpPr>
+            <a:spLocks noGrp="1"/>
+          </p:cNvSpPr>
+          <p:nvPr>
+            <p:ph type="title"/>
+          </p:nvPr>
+        </p:nvSpPr>
+        <p:spPr/>
+        <p:txBody>
+          <a:bodyPr/>
+          <a:lstStyle/>
+          <a:p>
+            <a:r>
+              <a:rPr lang="en-US" dirty="0"/>
+              <a:t>Security</a:t>
+            </a:r>
+          </a:p>
+        </p:txBody>
+      </p:sp>
+      <p:sp>
+        <p:nvSpPr>
+          <p:cNvPr id="3" name="Content Placeholder 2">
+            <a:extLst>
+              <a:ext uri="{FF2B5EF4-FFF2-40B4-BE49-F238E27FC236}">
+                <a16:creationId xmlns:a16="http://schemas.microsoft.com/office/drawing/2014/main" id="{6BEB79EA-465B-4946-8C22-FAAA2A79322B}"/>
+              </a:ext>
+            </a:extLst>
+          </p:cNvPr>
+          <p:cNvSpPr>
+            <a:spLocks noGrp="1"/>
+          </p:cNvSpPr>
+          <p:nvPr>
+            <p:ph idx="1"/>
+          </p:nvPr>
+        </p:nvSpPr>
+        <p:spPr/>
+        <p:txBody>
+          <a:bodyPr>
+            <a:normAutofit fontScale="92500" lnSpcReduction="20000"/>
+          </a:bodyPr>
+          <a:lstStyle/>
+          <a:p>
+            <a:pPr marL="457200" indent="-457200">
+              <a:buFont typeface="+mj-lt"/>
+              <a:buAutoNum type="arabicPeriod"/>
+            </a:pPr>
+            <a:r>
+              <a:rPr lang="en-US" dirty="0"/>
+              <a:t>The tablet or PC will have a secure certificate to ensure that it is approved to connect to the VPN</a:t>
+            </a:r>
+          </a:p>
+          <a:p>
+            <a:pPr marL="292608" lvl="1" indent="0">
+              <a:buNone/>
+            </a:pPr>
+            <a:r>
+              <a:rPr lang="en-US" dirty="0"/>
+              <a:t>    No other device will have access to this </a:t>
+            </a:r>
+            <a:r>
+              <a:rPr lang="en-US" dirty="0" err="1"/>
+              <a:t>vpn</a:t>
+            </a:r>
+            <a:r>
+              <a:rPr lang="en-US" dirty="0"/>
+              <a:t> outside of the facilities.</a:t>
+            </a:r>
+          </a:p>
+          <a:p>
+            <a:pPr marL="457200" indent="-457200">
+              <a:buFont typeface="+mj-lt"/>
+              <a:buAutoNum type="arabicPeriod"/>
+            </a:pPr>
+            <a:r>
+              <a:rPr lang="en-US" dirty="0"/>
+              <a:t>Each administrator approved will have a secure username and password to connect to the </a:t>
+            </a:r>
+            <a:r>
+              <a:rPr lang="en-US" b="1" dirty="0"/>
+              <a:t>VPN</a:t>
+            </a:r>
+            <a:r>
+              <a:rPr lang="en-US" dirty="0"/>
+              <a:t> (think of it as being clocked in)</a:t>
+            </a:r>
+          </a:p>
+          <a:p>
+            <a:pPr marL="457200" indent="-457200">
+              <a:buFont typeface="+mj-lt"/>
+              <a:buAutoNum type="arabicPeriod"/>
+            </a:pPr>
+            <a:r>
+              <a:rPr lang="en-US" dirty="0"/>
+              <a:t>Each administrator approved will have a secure username and password to log into the </a:t>
+            </a:r>
+            <a:r>
+              <a:rPr lang="en-US" b="1" dirty="0"/>
+              <a:t>application </a:t>
+            </a:r>
+            <a:r>
+              <a:rPr lang="en-US" dirty="0"/>
+              <a:t>(second level of verification of who’s accessing the system)</a:t>
+            </a:r>
+          </a:p>
+          <a:p>
+            <a:pPr marL="457200" indent="-457200">
+              <a:buFont typeface="+mj-lt"/>
+              <a:buAutoNum type="arabicPeriod"/>
+            </a:pPr>
+            <a:r>
+              <a:rPr lang="en-US" dirty="0"/>
+              <a:t>The website is tablet/phone/pc friendly (responsive) and is ONLY accessible through the VPN. (Access from an address on the internet or any other address outside of the </a:t>
+            </a:r>
+            <a:r>
+              <a:rPr lang="en-US" dirty="0" err="1"/>
+              <a:t>vpn</a:t>
+            </a:r>
+            <a:r>
+              <a:rPr lang="en-US" dirty="0"/>
+              <a:t> is strictly disallowed and requests are dropped)</a:t>
+            </a:r>
+          </a:p>
+          <a:p>
+            <a:pPr marL="457200" indent="-457200">
+              <a:buFont typeface="+mj-lt"/>
+              <a:buAutoNum type="arabicPeriod"/>
+            </a:pPr>
+            <a:r>
+              <a:rPr lang="en-US" dirty="0"/>
+              <a:t>The data displayed as people browse is the minimal amount needed for identification</a:t>
+            </a:r>
+          </a:p>
+          <a:p>
+            <a:pPr marL="457200" indent="-457200">
+              <a:buFont typeface="+mj-lt"/>
+              <a:buAutoNum type="arabicPeriod"/>
+            </a:pPr>
+            <a:r>
+              <a:rPr lang="en-US" dirty="0"/>
+              <a:t>Images taken by administrators will only be saved on Centerpoint Cloud Servers. No exports allowed unless clearance is provided.</a:t>
+            </a:r>
+          </a:p>
+          <a:p>
+            <a:pPr marL="457200" indent="-457200">
+              <a:buFont typeface="+mj-lt"/>
+              <a:buAutoNum type="arabicPeriod"/>
+            </a:pPr>
+            <a:r>
+              <a:rPr lang="en-US" dirty="0"/>
+              <a:t>Videos will be moderated by the admins so they do not reveal location of the person</a:t>
+            </a:r>
+          </a:p>
+          <a:p>
+            <a:pPr marL="457200" indent="-457200">
+              <a:buFont typeface="+mj-lt"/>
+              <a:buAutoNum type="arabicPeriod"/>
+            </a:pPr>
+            <a:endParaRPr lang="en-US" dirty="0"/>
+          </a:p>
+        </p:txBody>
+      </p:sp>
+    </p:spTree>
+    <p:extLst>
+      <p:ext uri="{BB962C8B-B14F-4D97-AF65-F5344CB8AC3E}">
+        <p14:creationId xmlns:p14="http://schemas.microsoft.com/office/powerpoint/2010/main" val="4197606523"/>
+      </p:ext>
+    </p:extLst>
+  </p:cSld>
+  <p:clrMapOvr>
+    <a:masterClrMapping/>
+  </p:clrMapOvr>
+</p:sld>
+</file>
+
+<file path=ppt/slides/slide9.xml><?xml version="1.0" encoding="utf-8"?>
+<p:sld xmlns:a="http://schemas.openxmlformats.org/drawingml/2006/main" xmlns:r="http://schemas.openxmlformats.org/officeDocument/2006/relationships" xmlns:p="http://schemas.openxmlformats.org/presentationml/2006/main">
+  <p:cSld>
+    <p:spTree>
+      <p:nvGrpSpPr>
+        <p:cNvPr id="1" name=""/>
+        <p:cNvGrpSpPr/>
+        <p:nvPr/>
+      </p:nvGrpSpPr>
+      <p:grpSpPr>
+        <a:xfrm>
+          <a:off x="0" y="0"/>
+          <a:ext cx="0" cy="0"/>
+          <a:chOff x="0" y="0"/>
+          <a:chExt cx="0" cy="0"/>
+        </a:xfrm>
+      </p:grpSpPr>
+      <p:sp>
+        <p:nvSpPr>
+          <p:cNvPr id="2" name="Title 1">
+            <a:extLst>
+              <a:ext uri="{FF2B5EF4-FFF2-40B4-BE49-F238E27FC236}">
+                <a16:creationId xmlns:a16="http://schemas.microsoft.com/office/drawing/2014/main" id="{07DE76DE-C6E5-AE46-8340-2F2AD755954A}"/>
+              </a:ext>
+            </a:extLst>
+          </p:cNvPr>
+          <p:cNvSpPr>
+            <a:spLocks noGrp="1"/>
+          </p:cNvSpPr>
+          <p:nvPr>
+            <p:ph type="title"/>
+          </p:nvPr>
+        </p:nvSpPr>
+        <p:spPr/>
+        <p:txBody>
+          <a:bodyPr/>
+          <a:lstStyle/>
+          <a:p>
+            <a:r>
+              <a:rPr lang="en-US" dirty="0"/>
+              <a:t>For more information contact us!</a:t>
+            </a:r>
+          </a:p>
+        </p:txBody>
+      </p:sp>
+      <p:sp>
+        <p:nvSpPr>
+          <p:cNvPr id="3" name="Content Placeholder 2">
+            <a:extLst>
+              <a:ext uri="{FF2B5EF4-FFF2-40B4-BE49-F238E27FC236}">
+                <a16:creationId xmlns:a16="http://schemas.microsoft.com/office/drawing/2014/main" id="{24D0B674-F693-FA4C-B5D8-B019432783EA}"/>
+              </a:ext>
+            </a:extLst>
+          </p:cNvPr>
+          <p:cNvSpPr>
+            <a:spLocks noGrp="1"/>
+          </p:cNvSpPr>
+          <p:nvPr>
+            <p:ph idx="1"/>
+          </p:nvPr>
+        </p:nvSpPr>
+        <p:spPr/>
+        <p:txBody>
+          <a:bodyPr/>
+          <a:lstStyle/>
+          <a:p>
+            <a:r>
+              <a:rPr lang="en-US" dirty="0"/>
+              <a:t>If you believe this application could be of use in helping reunite families, we need your help! </a:t>
+            </a:r>
+          </a:p>
+          <a:p>
+            <a:r>
+              <a:rPr lang="en-US" dirty="0"/>
+              <a:t>It is very important to have the blessing of the facilities and organizations involved. Please email us with referrals, security concerns, suggestions on improvements, and potential connections of influential people that need to become aware this technology exists. </a:t>
+            </a:r>
+          </a:p>
+          <a:p>
+            <a:endParaRPr lang="en-US" dirty="0"/>
+          </a:p>
+          <a:p>
+            <a:r>
+              <a:rPr lang="en-US" dirty="0"/>
+              <a:t>Email us at </a:t>
+            </a:r>
+            <a:r>
+              <a:rPr lang="en-US" dirty="0">
+                <a:hlinkClick r:id="rId2"/>
+              </a:rPr>
+              <a:t>reunite@centerpointcc.com</a:t>
+            </a:r>
+            <a:endParaRPr lang="en-US" dirty="0"/>
+          </a:p>
+          <a:p>
+            <a:endParaRPr lang="en-US" dirty="0"/>
+          </a:p>
+        </p:txBody>
+      </p:sp>
+    </p:spTree>
+    <p:extLst>
+      <p:ext uri="{BB962C8B-B14F-4D97-AF65-F5344CB8AC3E}">
+        <p14:creationId xmlns:p14="http://schemas.microsoft.com/office/powerpoint/2010/main" val="4251741473"/>
       </p:ext>
     </p:extLst>
   </p:cSld>

</xml_diff>

<commit_message>
new preso and appollo change
updated the presentation once more. -2 is the latest.
</commit_message>
<xml_diff>
--- a/ReUnite Overview.pptx
+++ b/ReUnite Overview.pptx
@@ -6,15 +6,17 @@
   </p:sldMasterIdLst>
   <p:sldIdLst>
     <p:sldId id="256" r:id="rId2"/>
-    <p:sldId id="267" r:id="rId3"/>
-    <p:sldId id="272" r:id="rId4"/>
-    <p:sldId id="273" r:id="rId5"/>
-    <p:sldId id="268" r:id="rId6"/>
-    <p:sldId id="270" r:id="rId7"/>
-    <p:sldId id="271" r:id="rId8"/>
-    <p:sldId id="269" r:id="rId9"/>
-    <p:sldId id="274" r:id="rId10"/>
-    <p:sldId id="257" r:id="rId11"/>
+    <p:sldId id="275" r:id="rId3"/>
+    <p:sldId id="267" r:id="rId4"/>
+    <p:sldId id="272" r:id="rId5"/>
+    <p:sldId id="273" r:id="rId6"/>
+    <p:sldId id="276" r:id="rId7"/>
+    <p:sldId id="268" r:id="rId8"/>
+    <p:sldId id="270" r:id="rId9"/>
+    <p:sldId id="271" r:id="rId10"/>
+    <p:sldId id="269" r:id="rId11"/>
+    <p:sldId id="274" r:id="rId12"/>
+    <p:sldId id="257" r:id="rId13"/>
   </p:sldIdLst>
   <p:sldSz cx="12192000" cy="6858000"/>
   <p:notesSz cx="6858000" cy="9144000"/>
@@ -3801,6 +3803,317 @@
           <a:chExt cx="0" cy="0"/>
         </a:xfrm>
       </p:grpSpPr>
+      <p:sp>
+        <p:nvSpPr>
+          <p:cNvPr id="2" name="Title 1">
+            <a:extLst>
+              <a:ext uri="{FF2B5EF4-FFF2-40B4-BE49-F238E27FC236}">
+                <a16:creationId xmlns:a16="http://schemas.microsoft.com/office/drawing/2014/main" id="{A206403A-6B13-5D4D-9524-EF700CC2FF9A}"/>
+              </a:ext>
+            </a:extLst>
+          </p:cNvPr>
+          <p:cNvSpPr>
+            <a:spLocks noGrp="1"/>
+          </p:cNvSpPr>
+          <p:nvPr>
+            <p:ph type="title"/>
+          </p:nvPr>
+        </p:nvSpPr>
+        <p:spPr/>
+        <p:txBody>
+          <a:bodyPr/>
+          <a:lstStyle/>
+          <a:p>
+            <a:r>
+              <a:rPr lang="en-US" dirty="0"/>
+              <a:t>Security</a:t>
+            </a:r>
+          </a:p>
+        </p:txBody>
+      </p:sp>
+      <p:sp>
+        <p:nvSpPr>
+          <p:cNvPr id="3" name="Content Placeholder 2">
+            <a:extLst>
+              <a:ext uri="{FF2B5EF4-FFF2-40B4-BE49-F238E27FC236}">
+                <a16:creationId xmlns:a16="http://schemas.microsoft.com/office/drawing/2014/main" id="{6BEB79EA-465B-4946-8C22-FAAA2A79322B}"/>
+              </a:ext>
+            </a:extLst>
+          </p:cNvPr>
+          <p:cNvSpPr>
+            <a:spLocks noGrp="1"/>
+          </p:cNvSpPr>
+          <p:nvPr>
+            <p:ph idx="1"/>
+          </p:nvPr>
+        </p:nvSpPr>
+        <p:spPr/>
+        <p:txBody>
+          <a:bodyPr>
+            <a:normAutofit fontScale="92500" lnSpcReduction="20000"/>
+          </a:bodyPr>
+          <a:lstStyle/>
+          <a:p>
+            <a:pPr marL="457200" indent="-457200">
+              <a:buFont typeface="+mj-lt"/>
+              <a:buAutoNum type="arabicPeriod"/>
+            </a:pPr>
+            <a:r>
+              <a:rPr lang="en-US" dirty="0"/>
+              <a:t>The tablet or PC will have a secure certificate to ensure that it is approved to connect to the VPN</a:t>
+            </a:r>
+          </a:p>
+          <a:p>
+            <a:pPr marL="292608" lvl="1" indent="0">
+              <a:buNone/>
+            </a:pPr>
+            <a:r>
+              <a:rPr lang="en-US" dirty="0"/>
+              <a:t>    No other device will have access to this </a:t>
+            </a:r>
+            <a:r>
+              <a:rPr lang="en-US" dirty="0" err="1"/>
+              <a:t>vpn</a:t>
+            </a:r>
+            <a:r>
+              <a:rPr lang="en-US" dirty="0"/>
+              <a:t> outside of the facilities.</a:t>
+            </a:r>
+          </a:p>
+          <a:p>
+            <a:pPr marL="457200" indent="-457200">
+              <a:buFont typeface="+mj-lt"/>
+              <a:buAutoNum type="arabicPeriod"/>
+            </a:pPr>
+            <a:r>
+              <a:rPr lang="en-US" dirty="0"/>
+              <a:t>Each administrator approved will have a secure username and password to connect to the </a:t>
+            </a:r>
+            <a:r>
+              <a:rPr lang="en-US" b="1" dirty="0"/>
+              <a:t>VPN</a:t>
+            </a:r>
+            <a:r>
+              <a:rPr lang="en-US" dirty="0"/>
+              <a:t> (think of it as being clocked in)</a:t>
+            </a:r>
+          </a:p>
+          <a:p>
+            <a:pPr marL="457200" indent="-457200">
+              <a:buFont typeface="+mj-lt"/>
+              <a:buAutoNum type="arabicPeriod"/>
+            </a:pPr>
+            <a:r>
+              <a:rPr lang="en-US" dirty="0"/>
+              <a:t>Each administrator approved will have a secure username and password to log into the </a:t>
+            </a:r>
+            <a:r>
+              <a:rPr lang="en-US" b="1" dirty="0"/>
+              <a:t>application </a:t>
+            </a:r>
+            <a:r>
+              <a:rPr lang="en-US" dirty="0"/>
+              <a:t>(second level of verification of who’s accessing the system)</a:t>
+            </a:r>
+          </a:p>
+          <a:p>
+            <a:pPr marL="457200" indent="-457200">
+              <a:buFont typeface="+mj-lt"/>
+              <a:buAutoNum type="arabicPeriod"/>
+            </a:pPr>
+            <a:r>
+              <a:rPr lang="en-US" dirty="0"/>
+              <a:t>The website is tablet/phone/pc friendly (responsive) and is ONLY accessible through the VPN. (Access from an address on the internet or any other address outside of the </a:t>
+            </a:r>
+            <a:r>
+              <a:rPr lang="en-US" dirty="0" err="1"/>
+              <a:t>vpn</a:t>
+            </a:r>
+            <a:r>
+              <a:rPr lang="en-US" dirty="0"/>
+              <a:t> is strictly disallowed and requests are dropped)</a:t>
+            </a:r>
+          </a:p>
+          <a:p>
+            <a:pPr marL="457200" indent="-457200">
+              <a:buFont typeface="+mj-lt"/>
+              <a:buAutoNum type="arabicPeriod"/>
+            </a:pPr>
+            <a:r>
+              <a:rPr lang="en-US" dirty="0"/>
+              <a:t>The data displayed as people browse is the minimal amount needed for identification</a:t>
+            </a:r>
+          </a:p>
+          <a:p>
+            <a:pPr marL="457200" indent="-457200">
+              <a:buFont typeface="+mj-lt"/>
+              <a:buAutoNum type="arabicPeriod"/>
+            </a:pPr>
+            <a:r>
+              <a:rPr lang="en-US" dirty="0"/>
+              <a:t>Images taken by administrators will only be saved on Centerpoint Cloud Servers. No exports allowed unless clearance is provided.</a:t>
+            </a:r>
+          </a:p>
+          <a:p>
+            <a:pPr marL="457200" indent="-457200">
+              <a:buFont typeface="+mj-lt"/>
+              <a:buAutoNum type="arabicPeriod"/>
+            </a:pPr>
+            <a:r>
+              <a:rPr lang="en-US" dirty="0"/>
+              <a:t>Videos will be moderated by the admins so they do not reveal location of the person</a:t>
+            </a:r>
+          </a:p>
+          <a:p>
+            <a:pPr marL="457200" indent="-457200">
+              <a:buFont typeface="+mj-lt"/>
+              <a:buAutoNum type="arabicPeriod"/>
+            </a:pPr>
+            <a:endParaRPr lang="en-US" dirty="0"/>
+          </a:p>
+        </p:txBody>
+      </p:sp>
+    </p:spTree>
+    <p:extLst>
+      <p:ext uri="{BB962C8B-B14F-4D97-AF65-F5344CB8AC3E}">
+        <p14:creationId xmlns:p14="http://schemas.microsoft.com/office/powerpoint/2010/main" val="4197606523"/>
+      </p:ext>
+    </p:extLst>
+  </p:cSld>
+  <p:clrMapOvr>
+    <a:masterClrMapping/>
+  </p:clrMapOvr>
+</p:sld>
+</file>
+
+<file path=ppt/slides/slide11.xml><?xml version="1.0" encoding="utf-8"?>
+<p:sld xmlns:a="http://schemas.openxmlformats.org/drawingml/2006/main" xmlns:r="http://schemas.openxmlformats.org/officeDocument/2006/relationships" xmlns:p="http://schemas.openxmlformats.org/presentationml/2006/main">
+  <p:cSld>
+    <p:spTree>
+      <p:nvGrpSpPr>
+        <p:cNvPr id="1" name=""/>
+        <p:cNvGrpSpPr/>
+        <p:nvPr/>
+      </p:nvGrpSpPr>
+      <p:grpSpPr>
+        <a:xfrm>
+          <a:off x="0" y="0"/>
+          <a:ext cx="0" cy="0"/>
+          <a:chOff x="0" y="0"/>
+          <a:chExt cx="0" cy="0"/>
+        </a:xfrm>
+      </p:grpSpPr>
+      <p:sp>
+        <p:nvSpPr>
+          <p:cNvPr id="2" name="Title 1">
+            <a:extLst>
+              <a:ext uri="{FF2B5EF4-FFF2-40B4-BE49-F238E27FC236}">
+                <a16:creationId xmlns:a16="http://schemas.microsoft.com/office/drawing/2014/main" id="{07DE76DE-C6E5-AE46-8340-2F2AD755954A}"/>
+              </a:ext>
+            </a:extLst>
+          </p:cNvPr>
+          <p:cNvSpPr>
+            <a:spLocks noGrp="1"/>
+          </p:cNvSpPr>
+          <p:nvPr>
+            <p:ph type="title"/>
+          </p:nvPr>
+        </p:nvSpPr>
+        <p:spPr/>
+        <p:txBody>
+          <a:bodyPr/>
+          <a:lstStyle/>
+          <a:p>
+            <a:r>
+              <a:rPr lang="en-US" dirty="0"/>
+              <a:t>For more information contact us!</a:t>
+            </a:r>
+          </a:p>
+        </p:txBody>
+      </p:sp>
+      <p:sp>
+        <p:nvSpPr>
+          <p:cNvPr id="3" name="Content Placeholder 2">
+            <a:extLst>
+              <a:ext uri="{FF2B5EF4-FFF2-40B4-BE49-F238E27FC236}">
+                <a16:creationId xmlns:a16="http://schemas.microsoft.com/office/drawing/2014/main" id="{24D0B674-F693-FA4C-B5D8-B019432783EA}"/>
+              </a:ext>
+            </a:extLst>
+          </p:cNvPr>
+          <p:cNvSpPr>
+            <a:spLocks noGrp="1"/>
+          </p:cNvSpPr>
+          <p:nvPr>
+            <p:ph idx="1"/>
+          </p:nvPr>
+        </p:nvSpPr>
+        <p:spPr/>
+        <p:txBody>
+          <a:bodyPr/>
+          <a:lstStyle/>
+          <a:p>
+            <a:r>
+              <a:rPr lang="en-US" dirty="0"/>
+              <a:t>If you believe this application could be of use in helping reunite families, we need your help! </a:t>
+            </a:r>
+          </a:p>
+          <a:p>
+            <a:r>
+              <a:rPr lang="en-US" dirty="0"/>
+              <a:t>It is very important to have the blessing of the facilities and organizations involved. Please email us with referrals, security concerns, suggestions on improvements, and potential connections of influential people that need to become aware this technology exists. </a:t>
+            </a:r>
+          </a:p>
+          <a:p>
+            <a:endParaRPr lang="en-US" dirty="0"/>
+          </a:p>
+          <a:p>
+            <a:r>
+              <a:rPr lang="en-US" dirty="0"/>
+              <a:t>Email us at </a:t>
+            </a:r>
+            <a:r>
+              <a:rPr lang="en-US" dirty="0">
+                <a:hlinkClick r:id="rId2"/>
+              </a:rPr>
+              <a:t>reunite@centerpointcc.com</a:t>
+            </a:r>
+            <a:endParaRPr lang="en-US" dirty="0"/>
+          </a:p>
+          <a:p>
+            <a:endParaRPr lang="en-US" dirty="0"/>
+          </a:p>
+        </p:txBody>
+      </p:sp>
+    </p:spTree>
+    <p:extLst>
+      <p:ext uri="{BB962C8B-B14F-4D97-AF65-F5344CB8AC3E}">
+        <p14:creationId xmlns:p14="http://schemas.microsoft.com/office/powerpoint/2010/main" val="4251741473"/>
+      </p:ext>
+    </p:extLst>
+  </p:cSld>
+  <p:clrMapOvr>
+    <a:masterClrMapping/>
+  </p:clrMapOvr>
+</p:sld>
+</file>
+
+<file path=ppt/slides/slide12.xml><?xml version="1.0" encoding="utf-8"?>
+<p:sld xmlns:a="http://schemas.openxmlformats.org/drawingml/2006/main" xmlns:r="http://schemas.openxmlformats.org/officeDocument/2006/relationships" xmlns:p="http://schemas.openxmlformats.org/presentationml/2006/main">
+  <p:cSld>
+    <p:spTree>
+      <p:nvGrpSpPr>
+        <p:cNvPr id="1" name=""/>
+        <p:cNvGrpSpPr/>
+        <p:nvPr/>
+      </p:nvGrpSpPr>
+      <p:grpSpPr>
+        <a:xfrm>
+          <a:off x="0" y="0"/>
+          <a:ext cx="0" cy="0"/>
+          <a:chOff x="0" y="0"/>
+          <a:chExt cx="0" cy="0"/>
+        </a:xfrm>
+      </p:grpSpPr>
     </p:spTree>
     <p:extLst>
       <p:ext uri="{BB962C8B-B14F-4D97-AF65-F5344CB8AC3E}">
@@ -3815,6 +4128,134 @@
 </file>
 
 <file path=ppt/slides/slide2.xml><?xml version="1.0" encoding="utf-8"?>
+<p:sld xmlns:a="http://schemas.openxmlformats.org/drawingml/2006/main" xmlns:r="http://schemas.openxmlformats.org/officeDocument/2006/relationships" xmlns:p="http://schemas.openxmlformats.org/presentationml/2006/main">
+  <p:cSld>
+    <p:spTree>
+      <p:nvGrpSpPr>
+        <p:cNvPr id="1" name=""/>
+        <p:cNvGrpSpPr/>
+        <p:nvPr/>
+      </p:nvGrpSpPr>
+      <p:grpSpPr>
+        <a:xfrm>
+          <a:off x="0" y="0"/>
+          <a:ext cx="0" cy="0"/>
+          <a:chOff x="0" y="0"/>
+          <a:chExt cx="0" cy="0"/>
+        </a:xfrm>
+      </p:grpSpPr>
+      <p:sp>
+        <p:nvSpPr>
+          <p:cNvPr id="2" name="Title 1">
+            <a:extLst>
+              <a:ext uri="{FF2B5EF4-FFF2-40B4-BE49-F238E27FC236}">
+                <a16:creationId xmlns:a16="http://schemas.microsoft.com/office/drawing/2014/main" id="{3E19491F-C7D7-C447-B4ED-A057D729ED69}"/>
+              </a:ext>
+            </a:extLst>
+          </p:cNvPr>
+          <p:cNvSpPr>
+            <a:spLocks noGrp="1"/>
+          </p:cNvSpPr>
+          <p:nvPr>
+            <p:ph type="title"/>
+          </p:nvPr>
+        </p:nvSpPr>
+        <p:spPr/>
+        <p:txBody>
+          <a:bodyPr/>
+          <a:lstStyle/>
+          <a:p>
+            <a:r>
+              <a:rPr lang="en-US" dirty="0"/>
+              <a:t>Family Separation Challenges</a:t>
+            </a:r>
+          </a:p>
+        </p:txBody>
+      </p:sp>
+      <p:sp>
+        <p:nvSpPr>
+          <p:cNvPr id="3" name="Content Placeholder 2">
+            <a:extLst>
+              <a:ext uri="{FF2B5EF4-FFF2-40B4-BE49-F238E27FC236}">
+                <a16:creationId xmlns:a16="http://schemas.microsoft.com/office/drawing/2014/main" id="{D5CAE20E-C607-8143-8050-6F0F732AC000}"/>
+              </a:ext>
+            </a:extLst>
+          </p:cNvPr>
+          <p:cNvSpPr>
+            <a:spLocks noGrp="1"/>
+          </p:cNvSpPr>
+          <p:nvPr>
+            <p:ph idx="1"/>
+          </p:nvPr>
+        </p:nvSpPr>
+        <p:spPr/>
+        <p:txBody>
+          <a:bodyPr/>
+          <a:lstStyle/>
+          <a:p>
+            <a:pPr>
+              <a:buFont typeface="Arial" panose="020B0604020202020204" pitchFamily="34" charset="0"/>
+              <a:buChar char="•"/>
+            </a:pPr>
+            <a:r>
+              <a:rPr lang="en-US" dirty="0"/>
+              <a:t> Current efforts to reunite families that were separated at the border have an uphill battle due to the timelines facilities have to work with and the verification procedures in place to ensure that the children under their care are NOT given to traffickers or dangerous people of no relation to them.</a:t>
+            </a:r>
+          </a:p>
+          <a:p>
+            <a:pPr>
+              <a:buFont typeface="Arial" panose="020B0604020202020204" pitchFamily="34" charset="0"/>
+              <a:buChar char="•"/>
+            </a:pPr>
+            <a:r>
+              <a:rPr lang="en-US" dirty="0"/>
+              <a:t> Add to that, that most of these facilities are private organizations with their own databases and own sets of procedures, not to mention being overwhelmed by the volume of children they are receiving, and it begins to look like an unending process. </a:t>
+            </a:r>
+          </a:p>
+          <a:p>
+            <a:pPr>
+              <a:buFont typeface="Arial" panose="020B0604020202020204" pitchFamily="34" charset="0"/>
+              <a:buChar char="•"/>
+            </a:pPr>
+            <a:r>
+              <a:rPr lang="en-US" dirty="0"/>
+              <a:t> There needs to be a way of unifying all of that data while at the same time giving parents and children hope of reuniting some day in the near future. </a:t>
+            </a:r>
+          </a:p>
+          <a:p>
+            <a:pPr>
+              <a:buFont typeface="Arial" panose="020B0604020202020204" pitchFamily="34" charset="0"/>
+              <a:buChar char="•"/>
+            </a:pPr>
+            <a:r>
+              <a:rPr lang="en-US" dirty="0"/>
+              <a:t> The </a:t>
+            </a:r>
+            <a:r>
+              <a:rPr lang="en-US" dirty="0" err="1"/>
+              <a:t>ReUnite</a:t>
+            </a:r>
+            <a:r>
+              <a:rPr lang="en-US" dirty="0"/>
+              <a:t> application aims to do just that.</a:t>
+            </a:r>
+          </a:p>
+        </p:txBody>
+      </p:sp>
+    </p:spTree>
+    <p:extLst>
+      <p:ext uri="{BB962C8B-B14F-4D97-AF65-F5344CB8AC3E}">
+        <p14:creationId xmlns:p14="http://schemas.microsoft.com/office/powerpoint/2010/main" val="3595804690"/>
+      </p:ext>
+    </p:extLst>
+  </p:cSld>
+  <p:clrMapOvr>
+    <a:masterClrMapping/>
+  </p:clrMapOvr>
+</p:sld>
+</file>
+
+<file path=ppt/slides/slide3.xml><?xml version="1.0" encoding="utf-8"?>
 <p:sld xmlns:a="http://schemas.openxmlformats.org/drawingml/2006/main" xmlns:r="http://schemas.openxmlformats.org/officeDocument/2006/relationships" xmlns:p="http://schemas.openxmlformats.org/presentationml/2006/main">
   <p:cSld>
     <p:spTree>
@@ -5784,7 +6225,7 @@
 </p:sld>
 </file>
 
-<file path=ppt/slides/slide3.xml><?xml version="1.0" encoding="utf-8"?>
+<file path=ppt/slides/slide4.xml><?xml version="1.0" encoding="utf-8"?>
 <p:sld xmlns:a="http://schemas.openxmlformats.org/drawingml/2006/main" xmlns:r="http://schemas.openxmlformats.org/officeDocument/2006/relationships" xmlns:p="http://schemas.openxmlformats.org/presentationml/2006/main">
   <p:cSld>
     <p:spTree>
@@ -5949,160 +6390,6 @@
     <p:extLst>
       <p:ext uri="{BB962C8B-B14F-4D97-AF65-F5344CB8AC3E}">
         <p14:creationId xmlns:p14="http://schemas.microsoft.com/office/powerpoint/2010/main" val="7073876"/>
-      </p:ext>
-    </p:extLst>
-  </p:cSld>
-  <p:clrMapOvr>
-    <a:masterClrMapping/>
-  </p:clrMapOvr>
-</p:sld>
-</file>
-
-<file path=ppt/slides/slide4.xml><?xml version="1.0" encoding="utf-8"?>
-<p:sld xmlns:a="http://schemas.openxmlformats.org/drawingml/2006/main" xmlns:r="http://schemas.openxmlformats.org/officeDocument/2006/relationships" xmlns:p="http://schemas.openxmlformats.org/presentationml/2006/main">
-  <p:cSld>
-    <p:spTree>
-      <p:nvGrpSpPr>
-        <p:cNvPr id="1" name=""/>
-        <p:cNvGrpSpPr/>
-        <p:nvPr/>
-      </p:nvGrpSpPr>
-      <p:grpSpPr>
-        <a:xfrm>
-          <a:off x="0" y="0"/>
-          <a:ext cx="0" cy="0"/>
-          <a:chOff x="0" y="0"/>
-          <a:chExt cx="0" cy="0"/>
-        </a:xfrm>
-      </p:grpSpPr>
-      <p:sp>
-        <p:nvSpPr>
-          <p:cNvPr id="2" name="Title 1">
-            <a:extLst>
-              <a:ext uri="{FF2B5EF4-FFF2-40B4-BE49-F238E27FC236}">
-                <a16:creationId xmlns:a16="http://schemas.microsoft.com/office/drawing/2014/main" id="{F66D9DA3-5DAD-9048-BCA8-2F54A9D4DA5E}"/>
-              </a:ext>
-            </a:extLst>
-          </p:cNvPr>
-          <p:cNvSpPr>
-            <a:spLocks noGrp="1"/>
-          </p:cNvSpPr>
-          <p:nvPr>
-            <p:ph type="title"/>
-          </p:nvPr>
-        </p:nvSpPr>
-        <p:spPr/>
-        <p:txBody>
-          <a:bodyPr/>
-          <a:lstStyle/>
-          <a:p>
-            <a:r>
-              <a:rPr lang="en-US" dirty="0"/>
-              <a:t>Facility Administrators</a:t>
-            </a:r>
-          </a:p>
-        </p:txBody>
-      </p:sp>
-      <p:pic>
-        <p:nvPicPr>
-          <p:cNvPr id="5" name="Content Placeholder 4">
-            <a:extLst>
-              <a:ext uri="{FF2B5EF4-FFF2-40B4-BE49-F238E27FC236}">
-                <a16:creationId xmlns:a16="http://schemas.microsoft.com/office/drawing/2014/main" id="{20E4F03B-4CE6-0B40-B3CA-6BE8D459FF61}"/>
-              </a:ext>
-            </a:extLst>
-          </p:cNvPr>
-          <p:cNvPicPr>
-            <a:picLocks noGrp="1" noChangeAspect="1"/>
-          </p:cNvPicPr>
-          <p:nvPr>
-            <p:ph idx="1"/>
-          </p:nvPr>
-        </p:nvPicPr>
-        <p:blipFill>
-          <a:blip r:embed="rId2"/>
-          <a:stretch>
-            <a:fillRect/>
-          </a:stretch>
-        </p:blipFill>
-        <p:spPr>
-          <a:xfrm>
-            <a:off x="1097280" y="2048107"/>
-            <a:ext cx="10058400" cy="2334985"/>
-          </a:xfrm>
-        </p:spPr>
-      </p:pic>
-      <p:sp>
-        <p:nvSpPr>
-          <p:cNvPr id="6" name="TextBox 5">
-            <a:extLst>
-              <a:ext uri="{FF2B5EF4-FFF2-40B4-BE49-F238E27FC236}">
-                <a16:creationId xmlns:a16="http://schemas.microsoft.com/office/drawing/2014/main" id="{C7F9A115-7F76-CC4C-B950-6C59BBFC3D52}"/>
-              </a:ext>
-            </a:extLst>
-          </p:cNvPr>
-          <p:cNvSpPr txBox="1"/>
-          <p:nvPr/>
-        </p:nvSpPr>
-        <p:spPr>
-          <a:xfrm>
-            <a:off x="1097280" y="4693839"/>
-            <a:ext cx="10269286" cy="923330"/>
-          </a:xfrm>
-          <a:prstGeom prst="rect">
-            <a:avLst/>
-          </a:prstGeom>
-          <a:noFill/>
-        </p:spPr>
-        <p:txBody>
-          <a:bodyPr wrap="none" rtlCol="0">
-            <a:spAutoFit/>
-          </a:bodyPr>
-          <a:lstStyle/>
-          <a:p>
-            <a:pPr marL="285750" indent="-285750">
-              <a:buFont typeface="Arial" panose="020B0604020202020204" pitchFamily="34" charset="0"/>
-              <a:buChar char="•"/>
-            </a:pPr>
-            <a:r>
-              <a:rPr lang="en-US" dirty="0"/>
-              <a:t>Tools are available for administrators to manage ticket queues and find potential matches for verification</a:t>
-            </a:r>
-          </a:p>
-          <a:p>
-            <a:pPr marL="285750" indent="-285750">
-              <a:buFont typeface="Arial" panose="020B0604020202020204" pitchFamily="34" charset="0"/>
-              <a:buChar char="•"/>
-            </a:pPr>
-            <a:r>
-              <a:rPr lang="en-US" dirty="0"/>
-              <a:t>Administrators register the children and the adults.</a:t>
-            </a:r>
-          </a:p>
-          <a:p>
-            <a:pPr marL="742950" lvl="1" indent="-285750">
-              <a:buFont typeface="Arial" panose="020B0604020202020204" pitchFamily="34" charset="0"/>
-              <a:buChar char="•"/>
-            </a:pPr>
-            <a:r>
-              <a:rPr lang="en-US" dirty="0"/>
-              <a:t>Everything in </a:t>
-            </a:r>
-            <a:r>
-              <a:rPr lang="en-US" dirty="0" err="1"/>
-              <a:t>ReUnite</a:t>
-            </a:r>
-            <a:r>
-              <a:rPr lang="en-US" dirty="0"/>
-              <a:t> happens under supervision of the admin</a:t>
-            </a:r>
-          </a:p>
-        </p:txBody>
-      </p:sp>
-    </p:spTree>
-    <p:extLst>
-      <p:ext uri="{BB962C8B-B14F-4D97-AF65-F5344CB8AC3E}">
-        <p14:creationId xmlns:p14="http://schemas.microsoft.com/office/powerpoint/2010/main" val="1707675513"/>
       </p:ext>
     </p:extLst>
   </p:cSld>
@@ -6134,7 +6421,7 @@
           <p:cNvPr id="2" name="Title 1">
             <a:extLst>
               <a:ext uri="{FF2B5EF4-FFF2-40B4-BE49-F238E27FC236}">
-                <a16:creationId xmlns:a16="http://schemas.microsoft.com/office/drawing/2014/main" id="{8ADD892E-A68F-2444-A43F-41447F2B44A1}"/>
+                <a16:creationId xmlns:a16="http://schemas.microsoft.com/office/drawing/2014/main" id="{F66D9DA3-5DAD-9048-BCA8-2F54A9D4DA5E}"/>
               </a:ext>
             </a:extLst>
           </p:cNvPr>
@@ -6151,125 +6438,104 @@
           <a:lstStyle/>
           <a:p>
             <a:r>
-              <a:rPr lang="en-US" dirty="0" err="1"/>
-              <a:t>ReUnite</a:t>
-            </a:r>
-            <a:endParaRPr lang="en-US" dirty="0"/>
-          </a:p>
-        </p:txBody>
-      </p:sp>
-      <p:sp>
-        <p:nvSpPr>
-          <p:cNvPr id="3" name="Content Placeholder 2">
+              <a:rPr lang="en-US" dirty="0"/>
+              <a:t>Facility Administrators</a:t>
+            </a:r>
+          </a:p>
+        </p:txBody>
+      </p:sp>
+      <p:pic>
+        <p:nvPicPr>
+          <p:cNvPr id="5" name="Content Placeholder 4">
             <a:extLst>
               <a:ext uri="{FF2B5EF4-FFF2-40B4-BE49-F238E27FC236}">
-                <a16:creationId xmlns:a16="http://schemas.microsoft.com/office/drawing/2014/main" id="{85BAD3AB-C8F2-3C4A-BABB-C3C85D20907A}"/>
+                <a16:creationId xmlns:a16="http://schemas.microsoft.com/office/drawing/2014/main" id="{20E4F03B-4CE6-0B40-B3CA-6BE8D459FF61}"/>
               </a:ext>
             </a:extLst>
           </p:cNvPr>
-          <p:cNvSpPr>
-            <a:spLocks noGrp="1"/>
-          </p:cNvSpPr>
+          <p:cNvPicPr>
+            <a:picLocks noGrp="1" noChangeAspect="1"/>
+          </p:cNvPicPr>
           <p:nvPr>
             <p:ph idx="1"/>
           </p:nvPr>
-        </p:nvSpPr>
-        <p:spPr/>
-        <p:txBody>
-          <a:bodyPr>
-            <a:normAutofit fontScale="85000" lnSpcReduction="10000"/>
+        </p:nvPicPr>
+        <p:blipFill>
+          <a:blip r:embed="rId2"/>
+          <a:stretch>
+            <a:fillRect/>
+          </a:stretch>
+        </p:blipFill>
+        <p:spPr>
+          <a:xfrm>
+            <a:off x="1097280" y="2048107"/>
+            <a:ext cx="10058400" cy="2334985"/>
+          </a:xfrm>
+        </p:spPr>
+      </p:pic>
+      <p:sp>
+        <p:nvSpPr>
+          <p:cNvPr id="6" name="TextBox 5">
+            <a:extLst>
+              <a:ext uri="{FF2B5EF4-FFF2-40B4-BE49-F238E27FC236}">
+                <a16:creationId xmlns:a16="http://schemas.microsoft.com/office/drawing/2014/main" id="{C7F9A115-7F76-CC4C-B950-6C59BBFC3D52}"/>
+              </a:ext>
+            </a:extLst>
+          </p:cNvPr>
+          <p:cNvSpPr txBox="1"/>
+          <p:nvPr/>
+        </p:nvSpPr>
+        <p:spPr>
+          <a:xfrm>
+            <a:off x="1097280" y="4693839"/>
+            <a:ext cx="10269286" cy="923330"/>
+          </a:xfrm>
+          <a:prstGeom prst="rect">
+            <a:avLst/>
+          </a:prstGeom>
+          <a:noFill/>
+        </p:spPr>
+        <p:txBody>
+          <a:bodyPr wrap="none" rtlCol="0">
+            <a:spAutoFit/>
           </a:bodyPr>
           <a:lstStyle/>
           <a:p>
-            <a:r>
-              <a:rPr lang="en-US" b="1" dirty="0"/>
-              <a:t>What is it?</a:t>
-            </a:r>
-          </a:p>
-          <a:p>
-            <a:pPr marL="457200" indent="-457200">
-              <a:buFont typeface="+mj-lt"/>
-              <a:buAutoNum type="arabicPeriod"/>
+            <a:pPr marL="285750" indent="-285750">
+              <a:buFont typeface="Arial" panose="020B0604020202020204" pitchFamily="34" charset="0"/>
+              <a:buChar char="•"/>
             </a:pPr>
             <a:r>
               <a:rPr lang="en-US" dirty="0"/>
-              <a:t>A technology that securely enables reunification of families</a:t>
-            </a:r>
-          </a:p>
-          <a:p>
-            <a:r>
-              <a:rPr lang="en-US" b="1" dirty="0"/>
-              <a:t>How it works? – High level process</a:t>
-            </a:r>
-          </a:p>
-          <a:p>
-            <a:pPr marL="457200" indent="-457200">
-              <a:buFont typeface="+mj-lt"/>
-              <a:buAutoNum type="arabicPeriod"/>
+              <a:t>Tools are available for administrators to manage ticket queues and find potential matches for verification</a:t>
+            </a:r>
+          </a:p>
+          <a:p>
+            <a:pPr marL="285750" indent="-285750">
+              <a:buFont typeface="Arial" panose="020B0604020202020204" pitchFamily="34" charset="0"/>
+              <a:buChar char="•"/>
             </a:pPr>
             <a:r>
               <a:rPr lang="en-US" dirty="0"/>
-              <a:t>Parents and Children register themselves (or are registered if too young) on a secured tablet or desktop computer at a secured or approved location. (strong security certificates are used)</a:t>
-            </a:r>
-          </a:p>
-          <a:p>
-            <a:pPr marL="749808" lvl="1" indent="-457200">
-              <a:buFont typeface="+mj-lt"/>
-              <a:buAutoNum type="arabicPeriod"/>
+              <a:t>Administrators register the children and the adults.</a:t>
+            </a:r>
+          </a:p>
+          <a:p>
+            <a:pPr marL="742950" lvl="1" indent="-285750">
+              <a:buFont typeface="Arial" panose="020B0604020202020204" pitchFamily="34" charset="0"/>
+              <a:buChar char="•"/>
             </a:pPr>
             <a:r>
               <a:rPr lang="en-US" dirty="0"/>
-              <a:t>The registration includes pictures of the parents and children along with a 30 second video message</a:t>
-            </a:r>
-          </a:p>
-          <a:p>
-            <a:pPr marL="457200" indent="-457200">
-              <a:buFont typeface="+mj-lt"/>
-              <a:buAutoNum type="arabicPeriod"/>
-            </a:pPr>
-            <a:r>
-              <a:rPr lang="en-US" dirty="0"/>
-              <a:t>Upon finding the family member, the child can click “Claim this person” to indicate a familial connection</a:t>
-            </a:r>
-          </a:p>
-          <a:p>
-            <a:pPr marL="749808" lvl="1" indent="-457200">
-              <a:buFont typeface="+mj-lt"/>
-              <a:buAutoNum type="arabicPeriod"/>
-            </a:pPr>
-            <a:r>
-              <a:rPr lang="en-US" dirty="0"/>
-              <a:t>A ticket is issued but all of the information remains internal to the database. </a:t>
-            </a:r>
-          </a:p>
-          <a:p>
-            <a:pPr marL="749808" lvl="1" indent="-457200">
-              <a:buFont typeface="+mj-lt"/>
-              <a:buAutoNum type="arabicPeriod"/>
-            </a:pPr>
-            <a:r>
-              <a:rPr lang="en-US" dirty="0"/>
-              <a:t>Only name and other approved info will be displayed</a:t>
-            </a:r>
-          </a:p>
-          <a:p>
-            <a:pPr marL="457200" indent="-457200">
-              <a:buFont typeface="+mj-lt"/>
-              <a:buAutoNum type="arabicPeriod"/>
-            </a:pPr>
-            <a:r>
-              <a:rPr lang="en-US" dirty="0"/>
-              <a:t>The facilities/Orgs access the central database and start working on the potential matches to reunite families</a:t>
-            </a:r>
-          </a:p>
-          <a:p>
-            <a:pPr marL="457200" indent="-457200">
-              <a:buFont typeface="+mj-lt"/>
-              <a:buAutoNum type="arabicPeriod"/>
-            </a:pPr>
-            <a:r>
-              <a:rPr lang="en-US" dirty="0"/>
-              <a:t>Verification of the match is completely up to the organization or facility. The application merely provides the data on potential matches and manages ticket work.</a:t>
+              <a:t>Everything in </a:t>
+            </a:r>
+            <a:r>
+              <a:rPr lang="en-US" dirty="0" err="1"/>
+              <a:t>ReUnite</a:t>
+            </a:r>
+            <a:r>
+              <a:rPr lang="en-US" dirty="0"/>
+              <a:t> happens under supervision of the admin</a:t>
             </a:r>
           </a:p>
         </p:txBody>
@@ -6277,7 +6543,7 @@
     </p:spTree>
     <p:extLst>
       <p:ext uri="{BB962C8B-B14F-4D97-AF65-F5344CB8AC3E}">
-        <p14:creationId xmlns:p14="http://schemas.microsoft.com/office/powerpoint/2010/main" val="1779747090"/>
+        <p14:creationId xmlns:p14="http://schemas.microsoft.com/office/powerpoint/2010/main" val="1707675513"/>
       </p:ext>
     </p:extLst>
   </p:cSld>
@@ -6309,7 +6575,7 @@
           <p:cNvPr id="2" name="Title 1">
             <a:extLst>
               <a:ext uri="{FF2B5EF4-FFF2-40B4-BE49-F238E27FC236}">
-                <a16:creationId xmlns:a16="http://schemas.microsoft.com/office/drawing/2014/main" id="{2AA5192C-7721-B84F-9F07-38156320FC8B}"/>
+                <a16:creationId xmlns:a16="http://schemas.microsoft.com/office/drawing/2014/main" id="{193EEA68-EE18-E04D-AE18-46D2098C9F52}"/>
               </a:ext>
             </a:extLst>
           </p:cNvPr>
@@ -6326,10 +6592,9 @@
           <a:lstStyle/>
           <a:p>
             <a:r>
-              <a:rPr lang="en-US" dirty="0" err="1"/>
-              <a:t>ReUnite</a:t>
-            </a:r>
-            <a:endParaRPr lang="en-US" dirty="0"/>
+              <a:rPr lang="en-US" dirty="0"/>
+              <a:t>Benefits</a:t>
+            </a:r>
           </a:p>
         </p:txBody>
       </p:sp>
@@ -6338,7 +6603,7 @@
           <p:cNvPr id="3" name="Content Placeholder 2">
             <a:extLst>
               <a:ext uri="{FF2B5EF4-FFF2-40B4-BE49-F238E27FC236}">
-                <a16:creationId xmlns:a16="http://schemas.microsoft.com/office/drawing/2014/main" id="{191BE215-BBF7-6648-9613-2A8E56A4A2E1}"/>
+                <a16:creationId xmlns:a16="http://schemas.microsoft.com/office/drawing/2014/main" id="{EEE8E6A8-BFA3-084A-ACEF-DDA9F4281DC1}"/>
               </a:ext>
             </a:extLst>
           </p:cNvPr>
@@ -6351,170 +6616,74 @@
         </p:nvSpPr>
         <p:spPr/>
         <p:txBody>
-          <a:bodyPr>
-            <a:normAutofit fontScale="92500" lnSpcReduction="20000"/>
-          </a:bodyPr>
+          <a:bodyPr/>
           <a:lstStyle/>
           <a:p>
-            <a:r>
-              <a:rPr lang="en-US" dirty="0"/>
-              <a:t>What the admin does (Walk-through):</a:t>
-            </a:r>
-          </a:p>
-          <a:p>
-            <a:pPr marL="457200" indent="-457200">
-              <a:buFont typeface="+mj-lt"/>
-              <a:buAutoNum type="arabicPeriod"/>
+            <a:pPr>
+              <a:buFont typeface="Arial" panose="020B0604020202020204" pitchFamily="34" charset="0"/>
+              <a:buChar char="•"/>
             </a:pPr>
             <a:r>
               <a:rPr lang="en-US" dirty="0"/>
-              <a:t>Child or validated parent approaches</a:t>
-            </a:r>
-          </a:p>
-          <a:p>
-            <a:pPr marL="457200" indent="-457200">
-              <a:buFont typeface="+mj-lt"/>
-              <a:buAutoNum type="arabicPeriod"/>
+              <a:t> Central, secure database to unify </a:t>
+            </a:r>
+            <a:r>
+              <a:rPr lang="en-US" b="1" dirty="0"/>
+              <a:t>just the relevant information </a:t>
+            </a:r>
+            <a:r>
+              <a:rPr lang="en-US" dirty="0"/>
+              <a:t>that will lead to a connection between parent and child.</a:t>
+            </a:r>
+          </a:p>
+          <a:p>
+            <a:pPr>
+              <a:buFont typeface="Arial" panose="020B0604020202020204" pitchFamily="34" charset="0"/>
+              <a:buChar char="•"/>
             </a:pPr>
             <a:r>
               <a:rPr lang="en-US" dirty="0"/>
-              <a:t>Registration information is taken in</a:t>
-            </a:r>
-          </a:p>
-          <a:p>
-            <a:pPr marL="457200" indent="-457200">
-              <a:buFont typeface="+mj-lt"/>
-              <a:buAutoNum type="arabicPeriod"/>
+              <a:t> Common across facilities to ensure information sharing</a:t>
+            </a:r>
+          </a:p>
+          <a:p>
+            <a:pPr>
+              <a:buFont typeface="Arial" panose="020B0604020202020204" pitchFamily="34" charset="0"/>
+              <a:buChar char="•"/>
             </a:pPr>
             <a:r>
               <a:rPr lang="en-US" dirty="0"/>
-              <a:t>Photo is taken</a:t>
-            </a:r>
-          </a:p>
-          <a:p>
-            <a:pPr marL="457200" indent="-457200">
-              <a:buFont typeface="+mj-lt"/>
-              <a:buAutoNum type="arabicPeriod"/>
+              <a:t> Useful tools available for managing the people, tickets, matches, and facility information</a:t>
+            </a:r>
+          </a:p>
+          <a:p>
+            <a:pPr>
+              <a:buFont typeface="Arial" panose="020B0604020202020204" pitchFamily="34" charset="0"/>
+              <a:buChar char="•"/>
             </a:pPr>
             <a:r>
               <a:rPr lang="en-US" dirty="0"/>
-              <a:t>Short 30 second video is taken </a:t>
-            </a:r>
-          </a:p>
-          <a:p>
-            <a:pPr marL="749808" lvl="1" indent="-457200">
-              <a:buFont typeface="+mj-lt"/>
-              <a:buAutoNum type="arabicPeriod"/>
+              <a:t> Secure, redundant, and distributed datastore to protect from data breach and data loss</a:t>
+            </a:r>
+          </a:p>
+          <a:p>
+            <a:pPr>
+              <a:buFont typeface="Arial" panose="020B0604020202020204" pitchFamily="34" charset="0"/>
+              <a:buChar char="•"/>
             </a:pPr>
             <a:r>
               <a:rPr lang="en-US" dirty="0"/>
-              <a:t>(”</a:t>
-            </a:r>
-            <a:r>
-              <a:rPr lang="en-US" dirty="0" err="1"/>
-              <a:t>Hola</a:t>
-            </a:r>
-            <a:r>
-              <a:rPr lang="en-US" dirty="0"/>
-              <a:t> </a:t>
-            </a:r>
-            <a:r>
-              <a:rPr lang="en-US" dirty="0" err="1"/>
-              <a:t>mijo</a:t>
-            </a:r>
-            <a:r>
-              <a:rPr lang="en-US" dirty="0"/>
-              <a:t>, </a:t>
-            </a:r>
-            <a:r>
-              <a:rPr lang="en-US" dirty="0" err="1"/>
-              <a:t>te</a:t>
-            </a:r>
-            <a:r>
-              <a:rPr lang="en-US" dirty="0"/>
-              <a:t> </a:t>
-            </a:r>
-            <a:r>
-              <a:rPr lang="en-US" dirty="0" err="1"/>
-              <a:t>extraño</a:t>
-            </a:r>
-            <a:r>
-              <a:rPr lang="en-US" dirty="0"/>
-              <a:t>! </a:t>
-            </a:r>
-            <a:r>
-              <a:rPr lang="en-US" dirty="0" err="1"/>
-              <a:t>Ya</a:t>
-            </a:r>
-            <a:r>
-              <a:rPr lang="en-US" dirty="0"/>
-              <a:t> pronto </a:t>
-            </a:r>
-            <a:r>
-              <a:rPr lang="en-US" dirty="0" err="1"/>
-              <a:t>estaremos</a:t>
-            </a:r>
-            <a:r>
-              <a:rPr lang="en-US" dirty="0"/>
-              <a:t> </a:t>
-            </a:r>
-            <a:r>
-              <a:rPr lang="en-US" dirty="0" err="1"/>
-              <a:t>juntos</a:t>
-            </a:r>
-            <a:r>
-              <a:rPr lang="en-US" dirty="0"/>
-              <a:t>!”)</a:t>
-            </a:r>
-          </a:p>
-          <a:p>
-            <a:pPr marL="457200" indent="-457200">
-              <a:buFont typeface="+mj-lt"/>
-              <a:buAutoNum type="arabicPeriod"/>
+              <a:t> Providing photos and videos is a humane way for the children to have some hope of seeing their parents.</a:t>
+            </a:r>
+          </a:p>
+          <a:p>
+            <a:pPr>
+              <a:buFont typeface="Arial" panose="020B0604020202020204" pitchFamily="34" charset="0"/>
+              <a:buChar char="•"/>
             </a:pPr>
             <a:r>
               <a:rPr lang="en-US" dirty="0"/>
-              <a:t>Child is allowed to search for their relatives by name or browse photos</a:t>
-            </a:r>
-          </a:p>
-          <a:p>
-            <a:pPr marL="457200" indent="-457200">
-              <a:buFont typeface="+mj-lt"/>
-              <a:buAutoNum type="arabicPeriod"/>
-            </a:pPr>
-            <a:r>
-              <a:rPr lang="en-US" dirty="0"/>
-              <a:t>A ticket is issued if a child has found a potential match for their parent</a:t>
-            </a:r>
-          </a:p>
-          <a:p>
-            <a:pPr marL="457200" indent="-457200">
-              <a:buFont typeface="+mj-lt"/>
-              <a:buAutoNum type="arabicPeriod"/>
-            </a:pPr>
-            <a:r>
-              <a:rPr lang="en-US" dirty="0"/>
-              <a:t>Validation process begins per the facility’s established procedures</a:t>
-            </a:r>
-          </a:p>
-          <a:p>
-            <a:pPr marL="457200" indent="-457200">
-              <a:buFont typeface="+mj-lt"/>
-              <a:buAutoNum type="arabicPeriod"/>
-            </a:pPr>
-            <a:endParaRPr lang="en-US" dirty="0"/>
-          </a:p>
-          <a:p>
-            <a:pPr marL="0" indent="0">
-              <a:buNone/>
-            </a:pPr>
-            <a:r>
-              <a:rPr lang="en-US" b="1" dirty="0"/>
-              <a:t>NOTE</a:t>
-            </a:r>
-            <a:r>
-              <a:rPr lang="en-US" dirty="0"/>
-              <a:t>: This is all done in-facility and under supervision</a:t>
+              <a:t> May speed up the process and provide a more streamlined process flow for these facilities to work through the reunification effort. </a:t>
             </a:r>
           </a:p>
         </p:txBody>
@@ -6522,7 +6691,7 @@
     </p:spTree>
     <p:extLst>
       <p:ext uri="{BB962C8B-B14F-4D97-AF65-F5344CB8AC3E}">
-        <p14:creationId xmlns:p14="http://schemas.microsoft.com/office/powerpoint/2010/main" val="1497192962"/>
+        <p14:creationId xmlns:p14="http://schemas.microsoft.com/office/powerpoint/2010/main" val="3255233302"/>
       </p:ext>
     </p:extLst>
   </p:cSld>
@@ -6554,7 +6723,7 @@
           <p:cNvPr id="2" name="Title 1">
             <a:extLst>
               <a:ext uri="{FF2B5EF4-FFF2-40B4-BE49-F238E27FC236}">
-                <a16:creationId xmlns:a16="http://schemas.microsoft.com/office/drawing/2014/main" id="{1E67313C-A334-4F48-A953-3A4C46DF8D66}"/>
+                <a16:creationId xmlns:a16="http://schemas.microsoft.com/office/drawing/2014/main" id="{8ADD892E-A68F-2444-A43F-41447F2B44A1}"/>
               </a:ext>
             </a:extLst>
           </p:cNvPr>
@@ -6571,9 +6740,10 @@
           <a:lstStyle/>
           <a:p>
             <a:r>
-              <a:rPr lang="en-US" dirty="0"/>
-              <a:t>What happens next</a:t>
-            </a:r>
+              <a:rPr lang="en-US" dirty="0" err="1"/>
+              <a:t>ReUnite</a:t>
+            </a:r>
+            <a:endParaRPr lang="en-US" dirty="0"/>
           </a:p>
         </p:txBody>
       </p:sp>
@@ -6582,7 +6752,7 @@
           <p:cNvPr id="3" name="Content Placeholder 2">
             <a:extLst>
               <a:ext uri="{FF2B5EF4-FFF2-40B4-BE49-F238E27FC236}">
-                <a16:creationId xmlns:a16="http://schemas.microsoft.com/office/drawing/2014/main" id="{BE6F4560-FB08-F24A-BB0F-219E0736CB45}"/>
+                <a16:creationId xmlns:a16="http://schemas.microsoft.com/office/drawing/2014/main" id="{85BAD3AB-C8F2-3C4A-BABB-C3C85D20907A}"/>
               </a:ext>
             </a:extLst>
           </p:cNvPr>
@@ -6596,9 +6766,15 @@
         <p:spPr/>
         <p:txBody>
           <a:bodyPr>
-            <a:normAutofit/>
+            <a:normAutofit fontScale="85000" lnSpcReduction="10000"/>
           </a:bodyPr>
           <a:lstStyle/>
+          <a:p>
+            <a:r>
+              <a:rPr lang="en-US" b="1" dirty="0"/>
+              <a:t>What is it?</a:t>
+            </a:r>
+          </a:p>
           <a:p>
             <a:pPr marL="457200" indent="-457200">
               <a:buFont typeface="+mj-lt"/>
@@ -6606,7 +6782,13 @@
             </a:pPr>
             <a:r>
               <a:rPr lang="en-US" dirty="0"/>
-              <a:t>If a child finds their family member, they tap or click a button that says “claim”.</a:t>
+              <a:t>A technology that securely enables reunification of families</a:t>
+            </a:r>
+          </a:p>
+          <a:p>
+            <a:r>
+              <a:rPr lang="en-US" b="1" dirty="0"/>
+              <a:t>How it works? – High level process</a:t>
             </a:r>
           </a:p>
           <a:p>
@@ -6616,7 +6798,17 @@
             </a:pPr>
             <a:r>
               <a:rPr lang="en-US" dirty="0"/>
-              <a:t>This sends the claim to a database where all the claims are held. It also opens a ticket.</a:t>
+              <a:t>Parents and Children register themselves (or are registered if too young) on a secured tablet or desktop computer at a secured or approved location. (strong security certificates are used)</a:t>
+            </a:r>
+          </a:p>
+          <a:p>
+            <a:pPr marL="749808" lvl="1" indent="-457200">
+              <a:buFont typeface="+mj-lt"/>
+              <a:buAutoNum type="arabicPeriod"/>
+            </a:pPr>
+            <a:r>
+              <a:rPr lang="en-US" dirty="0"/>
+              <a:t>The registration includes pictures of the parents and children along with a 30 second video message</a:t>
             </a:r>
           </a:p>
           <a:p>
@@ -6626,7 +6818,7 @@
             </a:pPr>
             <a:r>
               <a:rPr lang="en-US" dirty="0"/>
-              <a:t>An algorithm goes through and identifies instances when people have claimed each other and marks these claims as “potential-matches” along with opening up a ticket for an admin to work through.</a:t>
+              <a:t>Upon finding the family member, the child can click “Claim this person” to indicate a familial connection</a:t>
             </a:r>
           </a:p>
           <a:p>
@@ -6636,7 +6828,17 @@
             </a:pPr>
             <a:r>
               <a:rPr lang="en-US" dirty="0"/>
-              <a:t>This works in the instances where siblings have been separated for some reason.</a:t>
+              <a:t>A ticket is issued but all of the information remains internal to the database. </a:t>
+            </a:r>
+          </a:p>
+          <a:p>
+            <a:pPr marL="749808" lvl="1" indent="-457200">
+              <a:buFont typeface="+mj-lt"/>
+              <a:buAutoNum type="arabicPeriod"/>
+            </a:pPr>
+            <a:r>
+              <a:rPr lang="en-US" dirty="0"/>
+              <a:t>Only name and other approved info will be displayed</a:t>
             </a:r>
           </a:p>
           <a:p>
@@ -6646,25 +6848,7 @@
             </a:pPr>
             <a:r>
               <a:rPr lang="en-US" dirty="0"/>
-              <a:t>Once a ticket is generated, the application only has a way of closing the ticket or adding status to it. </a:t>
-            </a:r>
-          </a:p>
-          <a:p>
-            <a:pPr marL="749808" lvl="1" indent="-457200">
-              <a:buFont typeface="+mj-lt"/>
-              <a:buAutoNum type="arabicPeriod"/>
-            </a:pPr>
-            <a:r>
-              <a:rPr lang="en-US" dirty="0"/>
-              <a:t>The </a:t>
-            </a:r>
-            <a:r>
-              <a:rPr lang="en-US" dirty="0" err="1"/>
-              <a:t>ReUnite</a:t>
-            </a:r>
-            <a:r>
-              <a:rPr lang="en-US" dirty="0"/>
-              <a:t> system is not responsible for validating a match. Only identifying potential matches.</a:t>
+              <a:t>The facilities/Orgs access the central database and start working on the potential matches to reunite families</a:t>
             </a:r>
           </a:p>
           <a:p>
@@ -6674,7 +6858,7 @@
             </a:pPr>
             <a:r>
               <a:rPr lang="en-US" dirty="0"/>
-              <a:t>An admin can also look through the claims database and find claims that may not be matched but they know from experience and they can open up a ticket to work it. </a:t>
+              <a:t>Verification of the match is completely up to the organization or facility. The application merely provides the data on potential matches and manages ticket work.</a:t>
             </a:r>
           </a:p>
         </p:txBody>
@@ -6682,7 +6866,7 @@
     </p:spTree>
     <p:extLst>
       <p:ext uri="{BB962C8B-B14F-4D97-AF65-F5344CB8AC3E}">
-        <p14:creationId xmlns:p14="http://schemas.microsoft.com/office/powerpoint/2010/main" val="1007445634"/>
+        <p14:creationId xmlns:p14="http://schemas.microsoft.com/office/powerpoint/2010/main" val="1779747090"/>
       </p:ext>
     </p:extLst>
   </p:cSld>
@@ -6714,7 +6898,7 @@
           <p:cNvPr id="2" name="Title 1">
             <a:extLst>
               <a:ext uri="{FF2B5EF4-FFF2-40B4-BE49-F238E27FC236}">
-                <a16:creationId xmlns:a16="http://schemas.microsoft.com/office/drawing/2014/main" id="{A206403A-6B13-5D4D-9524-EF700CC2FF9A}"/>
+                <a16:creationId xmlns:a16="http://schemas.microsoft.com/office/drawing/2014/main" id="{2AA5192C-7721-B84F-9F07-38156320FC8B}"/>
               </a:ext>
             </a:extLst>
           </p:cNvPr>
@@ -6731,9 +6915,10 @@
           <a:lstStyle/>
           <a:p>
             <a:r>
-              <a:rPr lang="en-US" dirty="0"/>
-              <a:t>Security</a:t>
-            </a:r>
+              <a:rPr lang="en-US" dirty="0" err="1"/>
+              <a:t>ReUnite</a:t>
+            </a:r>
+            <a:endParaRPr lang="en-US" dirty="0"/>
           </a:p>
         </p:txBody>
       </p:sp>
@@ -6742,7 +6927,7 @@
           <p:cNvPr id="3" name="Content Placeholder 2">
             <a:extLst>
               <a:ext uri="{FF2B5EF4-FFF2-40B4-BE49-F238E27FC236}">
-                <a16:creationId xmlns:a16="http://schemas.microsoft.com/office/drawing/2014/main" id="{6BEB79EA-465B-4946-8C22-FAAA2A79322B}"/>
+                <a16:creationId xmlns:a16="http://schemas.microsoft.com/office/drawing/2014/main" id="{191BE215-BBF7-6648-9613-2A8E56A4A2E1}"/>
               </a:ext>
             </a:extLst>
           </p:cNvPr>
@@ -6760,30 +6945,19 @@
           </a:bodyPr>
           <a:lstStyle/>
           <a:p>
+            <a:r>
+              <a:rPr lang="en-US" dirty="0"/>
+              <a:t>What the admin does (Walk-through):</a:t>
+            </a:r>
+          </a:p>
+          <a:p>
             <a:pPr marL="457200" indent="-457200">
               <a:buFont typeface="+mj-lt"/>
               <a:buAutoNum type="arabicPeriod"/>
             </a:pPr>
             <a:r>
               <a:rPr lang="en-US" dirty="0"/>
-              <a:t>The tablet or PC will have a secure certificate to ensure that it is approved to connect to the VPN</a:t>
-            </a:r>
-          </a:p>
-          <a:p>
-            <a:pPr marL="292608" lvl="1" indent="0">
-              <a:buNone/>
-            </a:pPr>
-            <a:r>
-              <a:rPr lang="en-US" dirty="0"/>
-              <a:t>    No other device will have access to this </a:t>
-            </a:r>
-            <a:r>
-              <a:rPr lang="en-US" dirty="0" err="1"/>
-              <a:t>vpn</a:t>
-            </a:r>
-            <a:r>
-              <a:rPr lang="en-US" dirty="0"/>
-              <a:t> outside of the facilities.</a:t>
+              <a:t>Child or validated parent approaches</a:t>
             </a:r>
           </a:p>
           <a:p>
@@ -6793,15 +6967,7 @@
             </a:pPr>
             <a:r>
               <a:rPr lang="en-US" dirty="0"/>
-              <a:t>Each administrator approved will have a secure username and password to connect to the </a:t>
-            </a:r>
-            <a:r>
-              <a:rPr lang="en-US" b="1" dirty="0"/>
-              <a:t>VPN</a:t>
-            </a:r>
-            <a:r>
-              <a:rPr lang="en-US" dirty="0"/>
-              <a:t> (think of it as being clocked in)</a:t>
+              <a:t>Registration information is taken in</a:t>
             </a:r>
           </a:p>
           <a:p>
@@ -6811,15 +6977,7 @@
             </a:pPr>
             <a:r>
               <a:rPr lang="en-US" dirty="0"/>
-              <a:t>Each administrator approved will have a secure username and password to log into the </a:t>
-            </a:r>
-            <a:r>
-              <a:rPr lang="en-US" b="1" dirty="0"/>
-              <a:t>application </a:t>
-            </a:r>
-            <a:r>
-              <a:rPr lang="en-US" dirty="0"/>
-              <a:t>(second level of verification of who’s accessing the system)</a:t>
+              <a:t>Photo is taken</a:t>
             </a:r>
           </a:p>
           <a:p>
@@ -6829,15 +6987,73 @@
             </a:pPr>
             <a:r>
               <a:rPr lang="en-US" dirty="0"/>
-              <a:t>The website is tablet/phone/pc friendly (responsive) and is ONLY accessible through the VPN. (Access from an address on the internet or any other address outside of the </a:t>
+              <a:t>Short 30 second video is taken </a:t>
+            </a:r>
+          </a:p>
+          <a:p>
+            <a:pPr marL="749808" lvl="1" indent="-457200">
+              <a:buFont typeface="+mj-lt"/>
+              <a:buAutoNum type="arabicPeriod"/>
+            </a:pPr>
+            <a:r>
+              <a:rPr lang="en-US" dirty="0"/>
+              <a:t>(”</a:t>
             </a:r>
             <a:r>
               <a:rPr lang="en-US" dirty="0" err="1"/>
-              <a:t>vpn</a:t>
-            </a:r>
-            <a:r>
-              <a:rPr lang="en-US" dirty="0"/>
-              <a:t> is strictly disallowed and requests are dropped)</a:t>
+              <a:t>Hola</a:t>
+            </a:r>
+            <a:r>
+              <a:rPr lang="en-US" dirty="0"/>
+              <a:t> </a:t>
+            </a:r>
+            <a:r>
+              <a:rPr lang="en-US" dirty="0" err="1"/>
+              <a:t>mijo</a:t>
+            </a:r>
+            <a:r>
+              <a:rPr lang="en-US" dirty="0"/>
+              <a:t>, </a:t>
+            </a:r>
+            <a:r>
+              <a:rPr lang="en-US" dirty="0" err="1"/>
+              <a:t>te</a:t>
+            </a:r>
+            <a:r>
+              <a:rPr lang="en-US" dirty="0"/>
+              <a:t> </a:t>
+            </a:r>
+            <a:r>
+              <a:rPr lang="en-US" dirty="0" err="1"/>
+              <a:t>extraño</a:t>
+            </a:r>
+            <a:r>
+              <a:rPr lang="en-US" dirty="0"/>
+              <a:t>! </a:t>
+            </a:r>
+            <a:r>
+              <a:rPr lang="en-US" dirty="0" err="1"/>
+              <a:t>Ya</a:t>
+            </a:r>
+            <a:r>
+              <a:rPr lang="en-US" dirty="0"/>
+              <a:t> pronto </a:t>
+            </a:r>
+            <a:r>
+              <a:rPr lang="en-US" dirty="0" err="1"/>
+              <a:t>estaremos</a:t>
+            </a:r>
+            <a:r>
+              <a:rPr lang="en-US" dirty="0"/>
+              <a:t> </a:t>
+            </a:r>
+            <a:r>
+              <a:rPr lang="en-US" dirty="0" err="1"/>
+              <a:t>juntos</a:t>
+            </a:r>
+            <a:r>
+              <a:rPr lang="en-US" dirty="0"/>
+              <a:t>!”)</a:t>
             </a:r>
           </a:p>
           <a:p>
@@ -6847,7 +7063,7 @@
             </a:pPr>
             <a:r>
               <a:rPr lang="en-US" dirty="0"/>
-              <a:t>The data displayed as people browse is the minimal amount needed for identification</a:t>
+              <a:t>Child is allowed to search for their relatives by name or browse photos</a:t>
             </a:r>
           </a:p>
           <a:p>
@@ -6857,7 +7073,7 @@
             </a:pPr>
             <a:r>
               <a:rPr lang="en-US" dirty="0"/>
-              <a:t>Images taken by administrators will only be saved on Centerpoint Cloud Servers. No exports allowed unless clearance is provided.</a:t>
+              <a:t>A ticket is issued if a child has found a potential match for their parent</a:t>
             </a:r>
           </a:p>
           <a:p>
@@ -6867,7 +7083,7 @@
             </a:pPr>
             <a:r>
               <a:rPr lang="en-US" dirty="0"/>
-              <a:t>Videos will be moderated by the admins so they do not reveal location of the person</a:t>
+              <a:t>Validation process begins per the facility’s established procedures</a:t>
             </a:r>
           </a:p>
           <a:p>
@@ -6877,12 +7093,25 @@
             </a:pPr>
             <a:endParaRPr lang="en-US" dirty="0"/>
           </a:p>
+          <a:p>
+            <a:pPr marL="0" indent="0">
+              <a:buNone/>
+            </a:pPr>
+            <a:r>
+              <a:rPr lang="en-US" b="1" dirty="0"/>
+              <a:t>NOTE</a:t>
+            </a:r>
+            <a:r>
+              <a:rPr lang="en-US" dirty="0"/>
+              <a:t>: This is all done in-facility and under supervision</a:t>
+            </a:r>
+          </a:p>
         </p:txBody>
       </p:sp>
     </p:spTree>
     <p:extLst>
       <p:ext uri="{BB962C8B-B14F-4D97-AF65-F5344CB8AC3E}">
-        <p14:creationId xmlns:p14="http://schemas.microsoft.com/office/powerpoint/2010/main" val="4197606523"/>
+        <p14:creationId xmlns:p14="http://schemas.microsoft.com/office/powerpoint/2010/main" val="1497192962"/>
       </p:ext>
     </p:extLst>
   </p:cSld>
@@ -6914,7 +7143,7 @@
           <p:cNvPr id="2" name="Title 1">
             <a:extLst>
               <a:ext uri="{FF2B5EF4-FFF2-40B4-BE49-F238E27FC236}">
-                <a16:creationId xmlns:a16="http://schemas.microsoft.com/office/drawing/2014/main" id="{07DE76DE-C6E5-AE46-8340-2F2AD755954A}"/>
+                <a16:creationId xmlns:a16="http://schemas.microsoft.com/office/drawing/2014/main" id="{1E67313C-A334-4F48-A953-3A4C46DF8D66}"/>
               </a:ext>
             </a:extLst>
           </p:cNvPr>
@@ -6932,7 +7161,7 @@
           <a:p>
             <a:r>
               <a:rPr lang="en-US" dirty="0"/>
-              <a:t>For more information contact us!</a:t>
+              <a:t>What happens next</a:t>
             </a:r>
           </a:p>
         </p:txBody>
@@ -6942,7 +7171,7 @@
           <p:cNvPr id="3" name="Content Placeholder 2">
             <a:extLst>
               <a:ext uri="{FF2B5EF4-FFF2-40B4-BE49-F238E27FC236}">
-                <a16:creationId xmlns:a16="http://schemas.microsoft.com/office/drawing/2014/main" id="{24D0B674-F693-FA4C-B5D8-B019432783EA}"/>
+                <a16:creationId xmlns:a16="http://schemas.microsoft.com/office/drawing/2014/main" id="{BE6F4560-FB08-F24A-BB0F-219E0736CB45}"/>
               </a:ext>
             </a:extLst>
           </p:cNvPr>
@@ -6955,45 +7184,94 @@
         </p:nvSpPr>
         <p:spPr/>
         <p:txBody>
-          <a:bodyPr/>
+          <a:bodyPr>
+            <a:normAutofit/>
+          </a:bodyPr>
           <a:lstStyle/>
           <a:p>
-            <a:r>
-              <a:rPr lang="en-US" dirty="0"/>
-              <a:t>If you believe this application could be of use in helping reunite families, we need your help! </a:t>
-            </a:r>
-          </a:p>
-          <a:p>
-            <a:r>
-              <a:rPr lang="en-US" dirty="0"/>
-              <a:t>It is very important to have the blessing of the facilities and organizations involved. Please email us with referrals, security concerns, suggestions on improvements, and potential connections of influential people that need to become aware this technology exists. </a:t>
-            </a:r>
-          </a:p>
-          <a:p>
-            <a:endParaRPr lang="en-US" dirty="0"/>
-          </a:p>
-          <a:p>
-            <a:r>
-              <a:rPr lang="en-US" dirty="0"/>
-              <a:t>Email us at </a:t>
-            </a:r>
-            <a:r>
-              <a:rPr lang="en-US" dirty="0">
-                <a:hlinkClick r:id="rId2"/>
-              </a:rPr>
-              <a:t>reunite@centerpointcc.com</a:t>
-            </a:r>
-            <a:endParaRPr lang="en-US" dirty="0"/>
-          </a:p>
-          <a:p>
-            <a:endParaRPr lang="en-US" dirty="0"/>
+            <a:pPr marL="457200" indent="-457200">
+              <a:buFont typeface="+mj-lt"/>
+              <a:buAutoNum type="arabicPeriod"/>
+            </a:pPr>
+            <a:r>
+              <a:rPr lang="en-US" dirty="0"/>
+              <a:t>If a child finds their family member, they tap or click a button that says “claim”.</a:t>
+            </a:r>
+          </a:p>
+          <a:p>
+            <a:pPr marL="457200" indent="-457200">
+              <a:buFont typeface="+mj-lt"/>
+              <a:buAutoNum type="arabicPeriod"/>
+            </a:pPr>
+            <a:r>
+              <a:rPr lang="en-US" dirty="0"/>
+              <a:t>This sends the claim to a database where all the claims are held. It also opens a ticket.</a:t>
+            </a:r>
+          </a:p>
+          <a:p>
+            <a:pPr marL="457200" indent="-457200">
+              <a:buFont typeface="+mj-lt"/>
+              <a:buAutoNum type="arabicPeriod"/>
+            </a:pPr>
+            <a:r>
+              <a:rPr lang="en-US" dirty="0"/>
+              <a:t>An algorithm goes through and identifies instances when people have claimed each other and marks these claims as “potential-matches” along with opening up a ticket for an admin to work through.</a:t>
+            </a:r>
+          </a:p>
+          <a:p>
+            <a:pPr marL="749808" lvl="1" indent="-457200">
+              <a:buFont typeface="+mj-lt"/>
+              <a:buAutoNum type="arabicPeriod"/>
+            </a:pPr>
+            <a:r>
+              <a:rPr lang="en-US" dirty="0"/>
+              <a:t>This works in the instances where siblings have been separated for some reason.</a:t>
+            </a:r>
+          </a:p>
+          <a:p>
+            <a:pPr marL="457200" indent="-457200">
+              <a:buFont typeface="+mj-lt"/>
+              <a:buAutoNum type="arabicPeriod"/>
+            </a:pPr>
+            <a:r>
+              <a:rPr lang="en-US" dirty="0"/>
+              <a:t>Once a ticket is generated, the application only has a way of closing the ticket or adding status to it. </a:t>
+            </a:r>
+          </a:p>
+          <a:p>
+            <a:pPr marL="749808" lvl="1" indent="-457200">
+              <a:buFont typeface="+mj-lt"/>
+              <a:buAutoNum type="arabicPeriod"/>
+            </a:pPr>
+            <a:r>
+              <a:rPr lang="en-US" dirty="0"/>
+              <a:t>The </a:t>
+            </a:r>
+            <a:r>
+              <a:rPr lang="en-US" dirty="0" err="1"/>
+              <a:t>ReUnite</a:t>
+            </a:r>
+            <a:r>
+              <a:rPr lang="en-US" dirty="0"/>
+              <a:t> system is not responsible for validating a match. Only identifying potential matches.</a:t>
+            </a:r>
+          </a:p>
+          <a:p>
+            <a:pPr marL="457200" indent="-457200">
+              <a:buFont typeface="+mj-lt"/>
+              <a:buAutoNum type="arabicPeriod"/>
+            </a:pPr>
+            <a:r>
+              <a:rPr lang="en-US" dirty="0"/>
+              <a:t>An admin can also look through the claims database and find claims that may not be matched but they know from experience and they can open up a ticket to work it. </a:t>
+            </a:r>
           </a:p>
         </p:txBody>
       </p:sp>
     </p:spTree>
     <p:extLst>
       <p:ext uri="{BB962C8B-B14F-4D97-AF65-F5344CB8AC3E}">
-        <p14:creationId xmlns:p14="http://schemas.microsoft.com/office/powerpoint/2010/main" val="4251741473"/>
+        <p14:creationId xmlns:p14="http://schemas.microsoft.com/office/powerpoint/2010/main" val="1007445634"/>
       </p:ext>
     </p:extLst>
   </p:cSld>

</xml_diff>